<commit_message>
Updated the poster to match the online version's text and graphics.
</commit_message>
<xml_diff>
--- a/Poster.pptx
+++ b/Poster.pptx
@@ -104,6 +104,11 @@
       </a:defRPr>
     </a:lvl9pPr>
   </p:defaultTextStyle>
+  <p:extLst>
+    <p:ext uri="{EFAFB233-063F-42B5-8137-9DF3F51BA10A}">
+      <p15:sldGuideLst xmlns:p15="http://schemas.microsoft.com/office/powerpoint/2012/main"/>
+    </p:ext>
+  </p:extLst>
 </p:presentation>
 </file>
 
@@ -534,11 +539,11 @@
           <c:showPercent val="0"/>
           <c:showBubbleSize val="0"/>
         </c:dLbls>
-        <c:axId val="1459689104"/>
-        <c:axId val="1459683120"/>
+        <c:axId val="506226432"/>
+        <c:axId val="506240576"/>
       </c:scatterChart>
       <c:valAx>
-        <c:axId val="1459689104"/>
+        <c:axId val="506226432"/>
         <c:scaling>
           <c:orientation val="minMax"/>
           <c:max val="11000"/>
@@ -646,12 +651,12 @@
             <a:endParaRPr lang="en-US"/>
           </a:p>
         </c:txPr>
-        <c:crossAx val="1459683120"/>
+        <c:crossAx val="506240576"/>
         <c:crosses val="autoZero"/>
         <c:crossBetween val="midCat"/>
       </c:valAx>
       <c:valAx>
-        <c:axId val="1459683120"/>
+        <c:axId val="506240576"/>
         <c:scaling>
           <c:orientation val="minMax"/>
           <c:min val="0.5"/>
@@ -765,7 +770,7 @@
             <a:endParaRPr lang="en-US"/>
           </a:p>
         </c:txPr>
-        <c:crossAx val="1459689104"/>
+        <c:crossAx val="506226432"/>
         <c:crosses val="autoZero"/>
         <c:crossBetween val="midCat"/>
       </c:valAx>
@@ -779,6 +784,75 @@
     </c:plotArea>
     <c:legend>
       <c:legendPos val="r"/>
+      <c:legendEntry>
+        <c:idx val="0"/>
+        <c:txPr>
+          <a:bodyPr rot="0" spcFirstLastPara="1" vertOverflow="ellipsis" vert="horz" wrap="square" anchor="ctr" anchorCtr="1"/>
+          <a:lstStyle/>
+          <a:p>
+            <a:pPr>
+              <a:defRPr sz="2400" b="0" i="0" u="none" strike="noStrike" kern="1200" baseline="0">
+                <a:solidFill>
+                  <a:schemeClr val="tx1">
+                    <a:lumMod val="65000"/>
+                    <a:lumOff val="35000"/>
+                  </a:schemeClr>
+                </a:solidFill>
+                <a:latin typeface="Arial" panose="020B0604020202020204" pitchFamily="34" charset="0"/>
+                <a:ea typeface="+mn-ea"/>
+                <a:cs typeface="Arial" panose="020B0604020202020204" pitchFamily="34" charset="0"/>
+              </a:defRPr>
+            </a:pPr>
+            <a:endParaRPr lang="en-US"/>
+          </a:p>
+        </c:txPr>
+      </c:legendEntry>
+      <c:legendEntry>
+        <c:idx val="1"/>
+        <c:txPr>
+          <a:bodyPr rot="0" spcFirstLastPara="1" vertOverflow="ellipsis" vert="horz" wrap="square" anchor="ctr" anchorCtr="1"/>
+          <a:lstStyle/>
+          <a:p>
+            <a:pPr>
+              <a:defRPr sz="2400" b="0" i="0" u="none" strike="noStrike" kern="1200" baseline="0">
+                <a:solidFill>
+                  <a:schemeClr val="tx1">
+                    <a:lumMod val="65000"/>
+                    <a:lumOff val="35000"/>
+                  </a:schemeClr>
+                </a:solidFill>
+                <a:latin typeface="Arial" panose="020B0604020202020204" pitchFamily="34" charset="0"/>
+                <a:ea typeface="+mn-ea"/>
+                <a:cs typeface="Arial" panose="020B0604020202020204" pitchFamily="34" charset="0"/>
+              </a:defRPr>
+            </a:pPr>
+            <a:endParaRPr lang="en-US"/>
+          </a:p>
+        </c:txPr>
+      </c:legendEntry>
+      <c:legendEntry>
+        <c:idx val="2"/>
+        <c:txPr>
+          <a:bodyPr rot="0" spcFirstLastPara="1" vertOverflow="ellipsis" vert="horz" wrap="square" anchor="ctr" anchorCtr="1"/>
+          <a:lstStyle/>
+          <a:p>
+            <a:pPr>
+              <a:defRPr sz="2400" b="0" i="0" u="none" strike="noStrike" kern="1200" baseline="0">
+                <a:solidFill>
+                  <a:schemeClr val="tx1">
+                    <a:lumMod val="65000"/>
+                    <a:lumOff val="35000"/>
+                  </a:schemeClr>
+                </a:solidFill>
+                <a:latin typeface="Arial" panose="020B0604020202020204" pitchFamily="34" charset="0"/>
+                <a:ea typeface="+mn-ea"/>
+                <a:cs typeface="Arial" panose="020B0604020202020204" pitchFamily="34" charset="0"/>
+              </a:defRPr>
+            </a:pPr>
+            <a:endParaRPr lang="en-US"/>
+          </a:p>
+        </c:txPr>
+      </c:legendEntry>
       <c:layout/>
       <c:overlay val="0"/>
       <c:spPr>
@@ -1520,7 +1594,7 @@
           <a:p>
             <a:fld id="{CBFA995A-22C5-47EF-9778-D203161F4BA9}" type="datetimeFigureOut">
               <a:rPr lang="en-US" smtClean="0"/>
-              <a:t>5/27/2014</a:t>
+              <a:t>5/28/2014</a:t>
             </a:fld>
             <a:endParaRPr lang="en-US"/>
           </a:p>
@@ -1690,7 +1764,7 @@
           <a:p>
             <a:fld id="{CBFA995A-22C5-47EF-9778-D203161F4BA9}" type="datetimeFigureOut">
               <a:rPr lang="en-US" smtClean="0"/>
-              <a:t>5/27/2014</a:t>
+              <a:t>5/28/2014</a:t>
             </a:fld>
             <a:endParaRPr lang="en-US"/>
           </a:p>
@@ -1870,7 +1944,7 @@
           <a:p>
             <a:fld id="{CBFA995A-22C5-47EF-9778-D203161F4BA9}" type="datetimeFigureOut">
               <a:rPr lang="en-US" smtClean="0"/>
-              <a:t>5/27/2014</a:t>
+              <a:t>5/28/2014</a:t>
             </a:fld>
             <a:endParaRPr lang="en-US"/>
           </a:p>
@@ -2040,7 +2114,7 @@
           <a:p>
             <a:fld id="{CBFA995A-22C5-47EF-9778-D203161F4BA9}" type="datetimeFigureOut">
               <a:rPr lang="en-US" smtClean="0"/>
-              <a:t>5/27/2014</a:t>
+              <a:t>5/28/2014</a:t>
             </a:fld>
             <a:endParaRPr lang="en-US"/>
           </a:p>
@@ -2284,7 +2358,7 @@
           <a:p>
             <a:fld id="{CBFA995A-22C5-47EF-9778-D203161F4BA9}" type="datetimeFigureOut">
               <a:rPr lang="en-US" smtClean="0"/>
-              <a:t>5/27/2014</a:t>
+              <a:t>5/28/2014</a:t>
             </a:fld>
             <a:endParaRPr lang="en-US"/>
           </a:p>
@@ -2516,7 +2590,7 @@
           <a:p>
             <a:fld id="{CBFA995A-22C5-47EF-9778-D203161F4BA9}" type="datetimeFigureOut">
               <a:rPr lang="en-US" smtClean="0"/>
-              <a:t>5/27/2014</a:t>
+              <a:t>5/28/2014</a:t>
             </a:fld>
             <a:endParaRPr lang="en-US"/>
           </a:p>
@@ -2883,7 +2957,7 @@
           <a:p>
             <a:fld id="{CBFA995A-22C5-47EF-9778-D203161F4BA9}" type="datetimeFigureOut">
               <a:rPr lang="en-US" smtClean="0"/>
-              <a:t>5/27/2014</a:t>
+              <a:t>5/28/2014</a:t>
             </a:fld>
             <a:endParaRPr lang="en-US"/>
           </a:p>
@@ -3001,7 +3075,7 @@
           <a:p>
             <a:fld id="{CBFA995A-22C5-47EF-9778-D203161F4BA9}" type="datetimeFigureOut">
               <a:rPr lang="en-US" smtClean="0"/>
-              <a:t>5/27/2014</a:t>
+              <a:t>5/28/2014</a:t>
             </a:fld>
             <a:endParaRPr lang="en-US"/>
           </a:p>
@@ -3096,7 +3170,7 @@
           <a:p>
             <a:fld id="{CBFA995A-22C5-47EF-9778-D203161F4BA9}" type="datetimeFigureOut">
               <a:rPr lang="en-US" smtClean="0"/>
-              <a:t>5/27/2014</a:t>
+              <a:t>5/28/2014</a:t>
             </a:fld>
             <a:endParaRPr lang="en-US"/>
           </a:p>
@@ -3373,7 +3447,7 @@
           <a:p>
             <a:fld id="{CBFA995A-22C5-47EF-9778-D203161F4BA9}" type="datetimeFigureOut">
               <a:rPr lang="en-US" smtClean="0"/>
-              <a:t>5/27/2014</a:t>
+              <a:t>5/28/2014</a:t>
             </a:fld>
             <a:endParaRPr lang="en-US"/>
           </a:p>
@@ -3630,7 +3704,7 @@
           <a:p>
             <a:fld id="{CBFA995A-22C5-47EF-9778-D203161F4BA9}" type="datetimeFigureOut">
               <a:rPr lang="en-US" smtClean="0"/>
-              <a:t>5/27/2014</a:t>
+              <a:t>5/28/2014</a:t>
             </a:fld>
             <a:endParaRPr lang="en-US"/>
           </a:p>
@@ -3843,7 +3917,7 @@
           <a:p>
             <a:fld id="{CBFA995A-22C5-47EF-9778-D203161F4BA9}" type="datetimeFigureOut">
               <a:rPr lang="en-US" smtClean="0"/>
-              <a:t>5/27/2014</a:t>
+              <a:t>5/28/2014</a:t>
             </a:fld>
             <a:endParaRPr lang="en-US"/>
           </a:p>
@@ -4482,6 +4556,9 @@
             <a:avLst/>
           </a:prstGeom>
           <a:noFill/>
+          <a:ln>
+            <a:noFill/>
+          </a:ln>
         </p:spPr>
         <p:style>
           <a:lnRef idx="2">
@@ -4528,6 +4605,9 @@
             <a:avLst/>
           </a:prstGeom>
           <a:noFill/>
+          <a:ln>
+            <a:noFill/>
+          </a:ln>
         </p:spPr>
         <p:style>
           <a:lnRef idx="2">
@@ -4574,6 +4654,9 @@
             <a:avLst/>
           </a:prstGeom>
           <a:noFill/>
+          <a:ln>
+            <a:noFill/>
+          </a:ln>
         </p:spPr>
         <p:style>
           <a:lnRef idx="2">
@@ -4620,6 +4703,9 @@
             <a:avLst/>
           </a:prstGeom>
           <a:noFill/>
+          <a:ln>
+            <a:noFill/>
+          </a:ln>
         </p:spPr>
         <p:style>
           <a:lnRef idx="2">
@@ -4776,8 +4862,8 @@
         </p:nvSpPr>
         <p:spPr>
           <a:xfrm>
-            <a:off x="10106633" y="19030354"/>
-            <a:ext cx="14720713" cy="475387"/>
+            <a:off x="10106633" y="18904788"/>
+            <a:ext cx="14720713" cy="938719"/>
           </a:xfrm>
           <a:prstGeom prst="rect">
             <a:avLst/>
@@ -4792,15 +4878,115 @@
           <a:p>
             <a:pPr algn="r"/>
             <a:r>
-              <a:rPr lang="en-US" sz="2489" dirty="0">
+              <a:rPr lang="en-US" sz="2500" dirty="0">
                 <a:solidFill>
                   <a:schemeClr val="bg1"/>
                 </a:solidFill>
                 <a:latin typeface="Arial" panose="020B0604020202020204" pitchFamily="34" charset="0"/>
                 <a:cs typeface="Arial" panose="020B0604020202020204" pitchFamily="34" charset="0"/>
               </a:rPr>
-              <a:t>DEPARTMENT OF COMPUTING AND MATHEMATICAL SCIENCES</a:t>
-            </a:r>
+              <a:t>DEPARTMENT OF COMPUTING AND MATHEMATICAL </a:t>
+            </a:r>
+            <a:r>
+              <a:rPr lang="en-US" sz="2500" dirty="0" smtClean="0">
+                <a:solidFill>
+                  <a:schemeClr val="bg1"/>
+                </a:solidFill>
+                <a:latin typeface="Arial" panose="020B0604020202020204" pitchFamily="34" charset="0"/>
+                <a:cs typeface="Arial" panose="020B0604020202020204" pitchFamily="34" charset="0"/>
+              </a:rPr>
+              <a:t>SCIENCES</a:t>
+            </a:r>
+          </a:p>
+          <a:p>
+            <a:pPr algn="r"/>
+            <a:endParaRPr lang="en-US" sz="1000" dirty="0" smtClean="0">
+              <a:solidFill>
+                <a:schemeClr val="bg1"/>
+              </a:solidFill>
+              <a:latin typeface="Arial" panose="020B0604020202020204" pitchFamily="34" charset="0"/>
+              <a:cs typeface="Arial" panose="020B0604020202020204" pitchFamily="34" charset="0"/>
+            </a:endParaRPr>
+          </a:p>
+          <a:p>
+            <a:pPr algn="r"/>
+            <a:r>
+              <a:rPr lang="en-US" sz="2000" dirty="0">
+                <a:solidFill>
+                  <a:schemeClr val="bg1"/>
+                </a:solidFill>
+                <a:latin typeface="Arial" panose="020B0604020202020204" pitchFamily="34" charset="0"/>
+                <a:cs typeface="Arial" panose="020B0604020202020204" pitchFamily="34" charset="0"/>
+              </a:rPr>
+              <a:t>Special Thanks to Professor Adam </a:t>
+            </a:r>
+            <a:r>
+              <a:rPr lang="en-US" sz="2000" dirty="0" err="1">
+                <a:solidFill>
+                  <a:schemeClr val="bg1"/>
+                </a:solidFill>
+                <a:latin typeface="Arial" panose="020B0604020202020204" pitchFamily="34" charset="0"/>
+                <a:cs typeface="Arial" panose="020B0604020202020204" pitchFamily="34" charset="0"/>
+              </a:rPr>
+              <a:t>Wierman</a:t>
+            </a:r>
+            <a:r>
+              <a:rPr lang="en-US" sz="2000" dirty="0">
+                <a:solidFill>
+                  <a:schemeClr val="bg1"/>
+                </a:solidFill>
+                <a:latin typeface="Arial" panose="020B0604020202020204" pitchFamily="34" charset="0"/>
+                <a:cs typeface="Arial" panose="020B0604020202020204" pitchFamily="34" charset="0"/>
+              </a:rPr>
+              <a:t> and </a:t>
+            </a:r>
+            <a:r>
+              <a:rPr lang="en-US" sz="2000" dirty="0" err="1">
+                <a:solidFill>
+                  <a:schemeClr val="bg1"/>
+                </a:solidFill>
+                <a:latin typeface="Arial" panose="020B0604020202020204" pitchFamily="34" charset="0"/>
+                <a:cs typeface="Arial" panose="020B0604020202020204" pitchFamily="34" charset="0"/>
+              </a:rPr>
+              <a:t>Lingwen</a:t>
+            </a:r>
+            <a:r>
+              <a:rPr lang="en-US" sz="2000" dirty="0">
+                <a:solidFill>
+                  <a:schemeClr val="bg1"/>
+                </a:solidFill>
+                <a:latin typeface="Arial" panose="020B0604020202020204" pitchFamily="34" charset="0"/>
+                <a:cs typeface="Arial" panose="020B0604020202020204" pitchFamily="34" charset="0"/>
+              </a:rPr>
+              <a:t> </a:t>
+            </a:r>
+            <a:r>
+              <a:rPr lang="en-US" sz="2000" dirty="0" err="1">
+                <a:solidFill>
+                  <a:schemeClr val="bg1"/>
+                </a:solidFill>
+                <a:latin typeface="Arial" panose="020B0604020202020204" pitchFamily="34" charset="0"/>
+                <a:cs typeface="Arial" panose="020B0604020202020204" pitchFamily="34" charset="0"/>
+              </a:rPr>
+              <a:t>Gan</a:t>
+            </a:r>
+            <a:r>
+              <a:rPr lang="en-US" sz="2000" dirty="0">
+                <a:solidFill>
+                  <a:schemeClr val="bg1"/>
+                </a:solidFill>
+                <a:latin typeface="Arial" panose="020B0604020202020204" pitchFamily="34" charset="0"/>
+                <a:cs typeface="Arial" panose="020B0604020202020204" pitchFamily="34" charset="0"/>
+              </a:rPr>
+              <a:t> for Advice and Guidance</a:t>
+            </a:r>
+            <a:endParaRPr lang="en-US" sz="2000" dirty="0">
+              <a:solidFill>
+                <a:schemeClr val="bg1"/>
+              </a:solidFill>
+              <a:latin typeface="Arial" panose="020B0604020202020204" pitchFamily="34" charset="0"/>
+              <a:cs typeface="Arial" panose="020B0604020202020204" pitchFamily="34" charset="0"/>
+            </a:endParaRPr>
           </a:p>
         </p:txBody>
       </p:sp>
@@ -4899,6 +5085,9 @@
             <a:avLst/>
           </a:prstGeom>
           <a:noFill/>
+          <a:ln>
+            <a:noFill/>
+          </a:ln>
         </p:spPr>
         <p:style>
           <a:lnRef idx="2">
@@ -4939,7 +5128,7 @@
         <p:spPr>
           <a:xfrm>
             <a:off x="743526" y="3579122"/>
-            <a:ext cx="7688772" cy="1307281"/>
+            <a:ext cx="7688772" cy="3028906"/>
           </a:xfrm>
           <a:prstGeom prst="rect">
             <a:avLst/>
@@ -5077,14 +5266,272 @@
               </a:spcBef>
             </a:pPr>
             <a:r>
-              <a:rPr lang="en-US" sz="2400" spc="13" dirty="0" smtClean="0">
-                <a:solidFill>
-                  <a:srgbClr val="231F20"/>
-                </a:solidFill>
+              <a:rPr lang="en-US" sz="2400" dirty="0" smtClean="0">
                 <a:latin typeface="Arial"/>
                 <a:cs typeface="Arial"/>
               </a:rPr>
-              <a:t>--------- TODO: insert a description of our project ------</a:t>
+              <a:t>How are people feeling right now?</a:t>
+            </a:r>
+          </a:p>
+          <a:p>
+            <a:pPr marL="359070" marR="8084" indent="-342900">
+              <a:lnSpc>
+                <a:spcPct val="102899"/>
+              </a:lnSpc>
+              <a:spcBef>
+                <a:spcPts val="256"/>
+              </a:spcBef>
+              <a:buFont typeface="Arial" panose="020B0604020202020204" pitchFamily="34" charset="0"/>
+              <a:buChar char="•"/>
+            </a:pPr>
+            <a:r>
+              <a:rPr lang="en-US" sz="2400" dirty="0" smtClean="0">
+                <a:latin typeface="Arial"/>
+                <a:cs typeface="Arial"/>
+              </a:rPr>
+              <a:t>Interesting question for sociological research and corporate gauging of reactions</a:t>
+            </a:r>
+          </a:p>
+          <a:p>
+            <a:pPr marL="1456262" marR="8084" lvl="1" indent="-342900">
+              <a:lnSpc>
+                <a:spcPct val="102899"/>
+              </a:lnSpc>
+              <a:spcBef>
+                <a:spcPts val="256"/>
+              </a:spcBef>
+              <a:buFont typeface="Arial" panose="020B0604020202020204" pitchFamily="34" charset="0"/>
+              <a:buChar char="•"/>
+            </a:pPr>
+            <a:r>
+              <a:rPr lang="en-US" sz="2400" dirty="0" smtClean="0">
+                <a:latin typeface="Arial"/>
+                <a:cs typeface="Arial"/>
+              </a:rPr>
+              <a:t>How do discussions on a product spread</a:t>
+            </a:r>
+          </a:p>
+          <a:p>
+            <a:pPr marL="1456262" marR="8084" lvl="1" indent="-342900">
+              <a:lnSpc>
+                <a:spcPct val="102899"/>
+              </a:lnSpc>
+              <a:spcBef>
+                <a:spcPts val="256"/>
+              </a:spcBef>
+              <a:buFont typeface="Arial" panose="020B0604020202020204" pitchFamily="34" charset="0"/>
+              <a:buChar char="•"/>
+            </a:pPr>
+            <a:r>
+              <a:rPr lang="en-US" sz="2400" dirty="0" smtClean="0">
+                <a:latin typeface="Arial"/>
+                <a:cs typeface="Arial"/>
+              </a:rPr>
+              <a:t>How do people react to specific events</a:t>
+            </a:r>
+          </a:p>
+          <a:p>
+            <a:pPr marL="1456262" marR="8084" lvl="1" indent="-342900">
+              <a:lnSpc>
+                <a:spcPct val="102899"/>
+              </a:lnSpc>
+              <a:spcBef>
+                <a:spcPts val="256"/>
+              </a:spcBef>
+              <a:buFont typeface="Arial" panose="020B0604020202020204" pitchFamily="34" charset="0"/>
+              <a:buChar char="•"/>
+            </a:pPr>
+            <a:r>
+              <a:rPr lang="en-US" sz="2400" dirty="0" smtClean="0">
+                <a:latin typeface="Arial"/>
+                <a:cs typeface="Arial"/>
+              </a:rPr>
+              <a:t>How quickly does sentiment change?</a:t>
+            </a:r>
+          </a:p>
+        </p:txBody>
+      </p:sp>
+      <p:sp>
+        <p:nvSpPr>
+          <p:cNvPr id="65" name="object 3"/>
+          <p:cNvSpPr txBox="1"/>
+          <p:nvPr/>
+        </p:nvSpPr>
+        <p:spPr>
+          <a:xfrm>
+            <a:off x="743526" y="14232844"/>
+            <a:ext cx="7643984" cy="3908955"/>
+          </a:xfrm>
+          <a:prstGeom prst="rect">
+            <a:avLst/>
+          </a:prstGeom>
+        </p:spPr>
+        <p:txBody>
+          <a:bodyPr vert="horz" wrap="square" lIns="0" tIns="0" rIns="0" bIns="0" rtlCol="0">
+            <a:spAutoFit/>
+          </a:bodyPr>
+          <a:lstStyle/>
+          <a:p>
+            <a:pPr marL="16170"/>
+            <a:r>
+              <a:rPr lang="en-US" sz="3600" b="1" dirty="0">
+                <a:solidFill>
+                  <a:srgbClr val="231F20"/>
+                </a:solidFill>
+                <a:latin typeface="Arial"/>
+                <a:cs typeface="Arial"/>
+              </a:rPr>
+              <a:t>MACHINE LEARNING</a:t>
+            </a:r>
+            <a:endParaRPr sz="3600" dirty="0">
+              <a:latin typeface="Arial"/>
+              <a:cs typeface="Arial"/>
+            </a:endParaRPr>
+          </a:p>
+          <a:p>
+            <a:pPr marL="16170" marR="8084">
+              <a:lnSpc>
+                <a:spcPct val="102899"/>
+              </a:lnSpc>
+              <a:spcBef>
+                <a:spcPts val="256"/>
+              </a:spcBef>
+            </a:pPr>
+            <a:r>
+              <a:rPr lang="en-US" sz="2400" spc="13" dirty="0" smtClean="0">
+                <a:solidFill>
+                  <a:srgbClr val="231F20"/>
+                </a:solidFill>
+                <a:latin typeface="Arial"/>
+                <a:cs typeface="Arial"/>
+              </a:rPr>
+              <a:t>Idea was to develop classifiers to determine tweet sentiment.</a:t>
+            </a:r>
+          </a:p>
+          <a:p>
+            <a:pPr marL="16170" marR="8084">
+              <a:lnSpc>
+                <a:spcPct val="102899"/>
+              </a:lnSpc>
+              <a:spcBef>
+                <a:spcPts val="256"/>
+              </a:spcBef>
+            </a:pPr>
+            <a:endParaRPr lang="en-US" sz="2400" spc="13" dirty="0" smtClean="0">
+              <a:solidFill>
+                <a:srgbClr val="231F20"/>
+              </a:solidFill>
+              <a:latin typeface="Arial"/>
+              <a:cs typeface="Arial"/>
+            </a:endParaRPr>
+          </a:p>
+          <a:p>
+            <a:pPr marL="16170" marR="8084">
+              <a:lnSpc>
+                <a:spcPct val="102899"/>
+              </a:lnSpc>
+              <a:spcBef>
+                <a:spcPts val="256"/>
+              </a:spcBef>
+            </a:pPr>
+            <a:r>
+              <a:rPr lang="en-US" sz="3200" b="1" spc="13" dirty="0" smtClean="0">
+                <a:solidFill>
+                  <a:schemeClr val="tx1">
+                    <a:lumMod val="75000"/>
+                    <a:lumOff val="25000"/>
+                  </a:schemeClr>
+                </a:solidFill>
+                <a:latin typeface="Arial"/>
+                <a:cs typeface="Arial"/>
+              </a:rPr>
+              <a:t>Classification Methods</a:t>
+            </a:r>
+            <a:endParaRPr lang="en-US" sz="3200" b="1" spc="13" dirty="0" smtClean="0">
+              <a:solidFill>
+                <a:schemeClr val="tx1">
+                  <a:lumMod val="75000"/>
+                  <a:lumOff val="25000"/>
+                </a:schemeClr>
+              </a:solidFill>
+              <a:latin typeface="Arial"/>
+              <a:cs typeface="Arial"/>
+            </a:endParaRPr>
+          </a:p>
+          <a:p>
+            <a:pPr marL="359070" marR="8084" indent="-342900">
+              <a:lnSpc>
+                <a:spcPct val="102899"/>
+              </a:lnSpc>
+              <a:spcBef>
+                <a:spcPts val="256"/>
+              </a:spcBef>
+              <a:buFont typeface="Arial" panose="020B0604020202020204" pitchFamily="34" charset="0"/>
+              <a:buChar char="•"/>
+            </a:pPr>
+            <a:r>
+              <a:rPr lang="en-US" sz="2400" spc="13" dirty="0" smtClean="0">
+                <a:solidFill>
+                  <a:srgbClr val="231F20"/>
+                </a:solidFill>
+                <a:latin typeface="Arial"/>
+                <a:cs typeface="Arial"/>
+              </a:rPr>
+              <a:t>Naïve Bayes</a:t>
+            </a:r>
+          </a:p>
+          <a:p>
+            <a:pPr marL="359070" marR="8084" indent="-342900">
+              <a:lnSpc>
+                <a:spcPct val="102899"/>
+              </a:lnSpc>
+              <a:spcBef>
+                <a:spcPts val="256"/>
+              </a:spcBef>
+              <a:buFont typeface="Arial" panose="020B0604020202020204" pitchFamily="34" charset="0"/>
+              <a:buChar char="•"/>
+            </a:pPr>
+            <a:r>
+              <a:rPr lang="en-US" sz="2400" spc="13" dirty="0" smtClean="0">
+                <a:solidFill>
+                  <a:srgbClr val="231F20"/>
+                </a:solidFill>
+                <a:latin typeface="Arial"/>
+                <a:cs typeface="Arial"/>
+              </a:rPr>
+              <a:t>Maximum </a:t>
+            </a:r>
+            <a:r>
+              <a:rPr lang="en-US" sz="2400" spc="13" dirty="0" smtClean="0">
+                <a:solidFill>
+                  <a:srgbClr val="231F20"/>
+                </a:solidFill>
+                <a:latin typeface="Arial"/>
+                <a:cs typeface="Arial"/>
+              </a:rPr>
+              <a:t>Entropy</a:t>
+            </a:r>
+          </a:p>
+          <a:p>
+            <a:pPr marL="359070" marR="8084" indent="-342900">
+              <a:lnSpc>
+                <a:spcPct val="102899"/>
+              </a:lnSpc>
+              <a:spcBef>
+                <a:spcPts val="256"/>
+              </a:spcBef>
+              <a:buFont typeface="Arial" panose="020B0604020202020204" pitchFamily="34" charset="0"/>
+              <a:buChar char="•"/>
+            </a:pPr>
+            <a:r>
+              <a:rPr lang="en-US" sz="2400" spc="13" dirty="0" smtClean="0">
+                <a:solidFill>
+                  <a:srgbClr val="231F20"/>
+                </a:solidFill>
+                <a:latin typeface="Arial"/>
+                <a:cs typeface="Arial"/>
+              </a:rPr>
+              <a:t>Support Vector Machines</a:t>
             </a:r>
             <a:endParaRPr lang="en-US" sz="2400" dirty="0">
               <a:latin typeface="Arial"/>
@@ -5109,156 +5556,13 @@
       </p:sp>
       <p:sp>
         <p:nvSpPr>
-          <p:cNvPr id="65" name="object 3"/>
-          <p:cNvSpPr txBox="1"/>
-          <p:nvPr/>
-        </p:nvSpPr>
-        <p:spPr>
-          <a:xfrm>
-            <a:off x="743526" y="10280270"/>
-            <a:ext cx="7643984" cy="2944396"/>
-          </a:xfrm>
-          <a:prstGeom prst="rect">
-            <a:avLst/>
-          </a:prstGeom>
-        </p:spPr>
-        <p:txBody>
-          <a:bodyPr vert="horz" wrap="square" lIns="0" tIns="0" rIns="0" bIns="0" rtlCol="0">
-            <a:spAutoFit/>
-          </a:bodyPr>
-          <a:lstStyle/>
-          <a:p>
-            <a:pPr marL="16170"/>
-            <a:r>
-              <a:rPr lang="en-US" sz="3600" b="1" dirty="0">
-                <a:solidFill>
-                  <a:srgbClr val="231F20"/>
-                </a:solidFill>
-                <a:latin typeface="Arial"/>
-                <a:cs typeface="Arial"/>
-              </a:rPr>
-              <a:t>MACHINE LEARNING</a:t>
-            </a:r>
-            <a:endParaRPr sz="3600" dirty="0">
-              <a:latin typeface="Arial"/>
-              <a:cs typeface="Arial"/>
-            </a:endParaRPr>
-          </a:p>
-          <a:p>
-            <a:pPr marL="16170" marR="8084">
-              <a:lnSpc>
-                <a:spcPct val="102899"/>
-              </a:lnSpc>
-              <a:spcBef>
-                <a:spcPts val="256"/>
-              </a:spcBef>
-            </a:pPr>
-            <a:r>
-              <a:rPr lang="en-US" sz="2400" spc="13" dirty="0" smtClean="0">
-                <a:solidFill>
-                  <a:srgbClr val="231F20"/>
-                </a:solidFill>
-                <a:latin typeface="Arial"/>
-                <a:cs typeface="Arial"/>
-              </a:rPr>
-              <a:t>To classify tweets, we trained several machine learning algorithms, including</a:t>
-            </a:r>
-          </a:p>
-          <a:p>
-            <a:pPr marL="359070" marR="8084" indent="-342900">
-              <a:lnSpc>
-                <a:spcPct val="102899"/>
-              </a:lnSpc>
-              <a:spcBef>
-                <a:spcPts val="256"/>
-              </a:spcBef>
-              <a:buFont typeface="Arial" panose="020B0604020202020204" pitchFamily="34" charset="0"/>
-              <a:buChar char="•"/>
-            </a:pPr>
-            <a:r>
-              <a:rPr lang="en-US" sz="2400" spc="13" dirty="0" smtClean="0">
-                <a:solidFill>
-                  <a:srgbClr val="231F20"/>
-                </a:solidFill>
-                <a:latin typeface="Arial"/>
-                <a:cs typeface="Arial"/>
-              </a:rPr>
-              <a:t>Naïve Bayes</a:t>
-            </a:r>
-          </a:p>
-          <a:p>
-            <a:pPr marL="359070" marR="8084" indent="-342900">
-              <a:lnSpc>
-                <a:spcPct val="102899"/>
-              </a:lnSpc>
-              <a:spcBef>
-                <a:spcPts val="256"/>
-              </a:spcBef>
-              <a:buFont typeface="Arial" panose="020B0604020202020204" pitchFamily="34" charset="0"/>
-              <a:buChar char="•"/>
-            </a:pPr>
-            <a:r>
-              <a:rPr lang="en-US" sz="2400" spc="13" dirty="0" smtClean="0">
-                <a:solidFill>
-                  <a:srgbClr val="231F20"/>
-                </a:solidFill>
-                <a:latin typeface="Arial"/>
-                <a:cs typeface="Arial"/>
-              </a:rPr>
-              <a:t>Maximum Entropy</a:t>
-            </a:r>
-          </a:p>
-          <a:p>
-            <a:pPr marL="359070" marR="8084" indent="-342900">
-              <a:lnSpc>
-                <a:spcPct val="102899"/>
-              </a:lnSpc>
-              <a:spcBef>
-                <a:spcPts val="256"/>
-              </a:spcBef>
-              <a:buFont typeface="Arial" panose="020B0604020202020204" pitchFamily="34" charset="0"/>
-              <a:buChar char="•"/>
-            </a:pPr>
-            <a:r>
-              <a:rPr lang="en-US" sz="2400" spc="13" dirty="0" smtClean="0">
-                <a:solidFill>
-                  <a:srgbClr val="231F20"/>
-                </a:solidFill>
-                <a:latin typeface="Arial"/>
-                <a:cs typeface="Arial"/>
-              </a:rPr>
-              <a:t>Support Vector Machines</a:t>
-            </a:r>
-            <a:endParaRPr lang="en-US" sz="2400" dirty="0">
-              <a:latin typeface="Arial"/>
-              <a:cs typeface="Arial"/>
-            </a:endParaRPr>
-          </a:p>
-          <a:p>
-            <a:pPr marL="16170" marR="8084">
-              <a:lnSpc>
-                <a:spcPct val="102899"/>
-              </a:lnSpc>
-              <a:spcBef>
-                <a:spcPts val="256"/>
-              </a:spcBef>
-            </a:pPr>
-            <a:endParaRPr lang="en-US" sz="1867" dirty="0">
-              <a:latin typeface="Arial"/>
-              <a:cs typeface="Arial"/>
-            </a:endParaRPr>
-          </a:p>
-        </p:txBody>
-      </p:sp>
-      <p:sp>
-        <p:nvSpPr>
           <p:cNvPr id="66" name="object 3"/>
           <p:cNvSpPr txBox="1"/>
           <p:nvPr/>
         </p:nvSpPr>
         <p:spPr>
           <a:xfrm>
-            <a:off x="16885875" y="3629781"/>
+            <a:off x="16885875" y="6344073"/>
             <a:ext cx="7653799" cy="888385"/>
           </a:xfrm>
           <a:prstGeom prst="rect">
@@ -5431,8 +5735,8 @@
         </p:nvSpPr>
         <p:spPr>
           <a:xfrm>
-            <a:off x="682577" y="5287708"/>
-            <a:ext cx="7656445" cy="2219325"/>
+            <a:off x="682577" y="10390660"/>
+            <a:ext cx="7656445" cy="1787605"/>
           </a:xfrm>
           <a:prstGeom prst="rect">
             <a:avLst/>
@@ -5455,33 +5759,6 @@
               </a:rPr>
               <a:t>Goals</a:t>
             </a:r>
-          </a:p>
-          <a:p>
-            <a:pPr marL="16170" marR="8084">
-              <a:lnSpc>
-                <a:spcPct val="102899"/>
-              </a:lnSpc>
-              <a:spcBef>
-                <a:spcPts val="433"/>
-              </a:spcBef>
-            </a:pPr>
-            <a:r>
-              <a:rPr lang="en-US" sz="2400" spc="13" dirty="0" smtClean="0">
-                <a:solidFill>
-                  <a:srgbClr val="231F20"/>
-                </a:solidFill>
-                <a:latin typeface="Arial" panose="020B0604020202020204" pitchFamily="34" charset="0"/>
-                <a:cs typeface="Arial" panose="020B0604020202020204" pitchFamily="34" charset="0"/>
-              </a:rPr>
-              <a:t>------ TODO: Goals --------</a:t>
-            </a:r>
-            <a:endParaRPr lang="en-US" sz="2400" spc="6" dirty="0">
-              <a:solidFill>
-                <a:srgbClr val="231F20"/>
-              </a:solidFill>
-              <a:latin typeface="Arial" panose="020B0604020202020204" pitchFamily="34" charset="0"/>
-              <a:cs typeface="Arial" panose="020B0604020202020204" pitchFamily="34" charset="0"/>
-            </a:endParaRPr>
           </a:p>
           <a:p>
             <a:pPr marL="282878" marR="8084" indent="-266708">
@@ -5495,14 +5772,14 @@
               <a:buChar char="•"/>
             </a:pPr>
             <a:r>
-              <a:rPr lang="en-US" sz="2400" spc="6" dirty="0">
+              <a:rPr lang="en-US" sz="2400" spc="6" dirty="0" smtClean="0">
                 <a:solidFill>
                   <a:srgbClr val="231F20"/>
                 </a:solidFill>
                 <a:latin typeface="Arial" panose="020B0604020202020204" pitchFamily="34" charset="0"/>
                 <a:cs typeface="Arial" panose="020B0604020202020204" pitchFamily="34" charset="0"/>
               </a:rPr>
-              <a:t>Goal 1</a:t>
+              <a:t>Categorize Tweets based on emotional content</a:t>
             </a:r>
             <a:endParaRPr lang="en-US" sz="2400" spc="6" dirty="0" smtClean="0">
               <a:solidFill>
@@ -5531,7 +5808,7 @@
                 <a:latin typeface="Arial" panose="020B0604020202020204" pitchFamily="34" charset="0"/>
                 <a:cs typeface="Arial" panose="020B0604020202020204" pitchFamily="34" charset="0"/>
               </a:rPr>
-              <a:t>Goal 2</a:t>
+              <a:t>Visualize sentiments in an accessible manner</a:t>
             </a:r>
             <a:endParaRPr lang="en-US" sz="2400" spc="6" dirty="0">
               <a:solidFill>
@@ -5553,14 +5830,11 @@
               <a:buChar char="•"/>
             </a:pPr>
             <a:r>
-              <a:rPr lang="en-US" sz="2400" spc="6" dirty="0">
-                <a:solidFill>
-                  <a:srgbClr val="231F20"/>
-                </a:solidFill>
+              <a:rPr lang="en-US" sz="2400" dirty="0" smtClean="0">
                 <a:latin typeface="Arial" panose="020B0604020202020204" pitchFamily="34" charset="0"/>
                 <a:cs typeface="Arial" panose="020B0604020202020204" pitchFamily="34" charset="0"/>
               </a:rPr>
-              <a:t>Goal 3</a:t>
+              <a:t>Allow for interactive filtering of Tweets based on topic</a:t>
             </a:r>
             <a:endParaRPr sz="2400" dirty="0">
               <a:latin typeface="Arial" panose="020B0604020202020204" pitchFamily="34" charset="0"/>
@@ -5577,8 +5851,8 @@
         </p:nvSpPr>
         <p:spPr>
           <a:xfrm>
-            <a:off x="727363" y="8020073"/>
-            <a:ext cx="7656445" cy="924164"/>
+            <a:off x="727363" y="12297115"/>
+            <a:ext cx="7656445" cy="1787605"/>
           </a:xfrm>
           <a:prstGeom prst="rect">
             <a:avLst/>
@@ -5592,7 +5866,7 @@
           <a:p>
             <a:pPr marL="16170"/>
             <a:r>
-              <a:rPr lang="en-US" sz="3200" b="1" dirty="0">
+              <a:rPr lang="en-US" sz="3200" b="1" dirty="0" smtClean="0">
                 <a:solidFill>
                   <a:srgbClr val="4C4D4F"/>
                 </a:solidFill>
@@ -5601,19 +5875,17 @@
               </a:rPr>
               <a:t>Challenges</a:t>
             </a:r>
-            <a:endParaRPr sz="3200" dirty="0">
-              <a:latin typeface="Arial"/>
-              <a:cs typeface="Arial"/>
-            </a:endParaRPr>
-          </a:p>
-          <a:p>
-            <a:pPr marL="16170" marR="8084">
+          </a:p>
+          <a:p>
+            <a:pPr marL="359070" marR="8084" indent="-342900">
               <a:lnSpc>
                 <a:spcPct val="102899"/>
               </a:lnSpc>
               <a:spcBef>
                 <a:spcPts val="433"/>
               </a:spcBef>
+              <a:buFont typeface="Arial" panose="020B0604020202020204" pitchFamily="34" charset="0"/>
+              <a:buChar char="•"/>
             </a:pPr>
             <a:r>
               <a:rPr lang="en-US" sz="2400" spc="13" dirty="0" smtClean="0">
@@ -5623,12 +5895,72 @@
                 <a:latin typeface="Arial" panose="020B0604020202020204" pitchFamily="34" charset="0"/>
                 <a:cs typeface="Arial" panose="020B0604020202020204" pitchFamily="34" charset="0"/>
               </a:rPr>
-              <a:t>------ TODO: Challenges</a:t>
-            </a:r>
-            <a:endParaRPr sz="2400" dirty="0">
-              <a:latin typeface="Arial" panose="020B0604020202020204" pitchFamily="34" charset="0"/>
-              <a:cs typeface="Arial" panose="020B0604020202020204" pitchFamily="34" charset="0"/>
-            </a:endParaRPr>
+              <a:t>Correctly analyze sentiments</a:t>
+            </a:r>
+          </a:p>
+          <a:p>
+            <a:pPr marL="359070" marR="8084" indent="-342900">
+              <a:lnSpc>
+                <a:spcPct val="102899"/>
+              </a:lnSpc>
+              <a:spcBef>
+                <a:spcPts val="433"/>
+              </a:spcBef>
+              <a:buFont typeface="Arial" panose="020B0604020202020204" pitchFamily="34" charset="0"/>
+              <a:buChar char="•"/>
+            </a:pPr>
+            <a:r>
+              <a:rPr lang="en-US" sz="2400" spc="13" dirty="0" smtClean="0">
+                <a:solidFill>
+                  <a:srgbClr val="231F20"/>
+                </a:solidFill>
+                <a:latin typeface="Arial" panose="020B0604020202020204" pitchFamily="34" charset="0"/>
+                <a:cs typeface="Arial" panose="020B0604020202020204" pitchFamily="34" charset="0"/>
+              </a:rPr>
+              <a:t>Obtain live Tweets (Twitter </a:t>
+            </a:r>
+            <a:r>
+              <a:rPr lang="en-US" sz="2400" spc="13" dirty="0" err="1" smtClean="0">
+                <a:solidFill>
+                  <a:srgbClr val="231F20"/>
+                </a:solidFill>
+                <a:latin typeface="Arial" panose="020B0604020202020204" pitchFamily="34" charset="0"/>
+                <a:cs typeface="Arial" panose="020B0604020202020204" pitchFamily="34" charset="0"/>
+              </a:rPr>
+              <a:t>Firehose</a:t>
+            </a:r>
+            <a:r>
+              <a:rPr lang="en-US" sz="2400" spc="13" dirty="0" smtClean="0">
+                <a:solidFill>
+                  <a:srgbClr val="231F20"/>
+                </a:solidFill>
+                <a:latin typeface="Arial" panose="020B0604020202020204" pitchFamily="34" charset="0"/>
+                <a:cs typeface="Arial" panose="020B0604020202020204" pitchFamily="34" charset="0"/>
+              </a:rPr>
+              <a:t> API)</a:t>
+            </a:r>
+          </a:p>
+          <a:p>
+            <a:pPr marL="359070" marR="8084" indent="-342900">
+              <a:lnSpc>
+                <a:spcPct val="102899"/>
+              </a:lnSpc>
+              <a:spcBef>
+                <a:spcPts val="433"/>
+              </a:spcBef>
+              <a:buFont typeface="Arial" panose="020B0604020202020204" pitchFamily="34" charset="0"/>
+              <a:buChar char="•"/>
+            </a:pPr>
+            <a:r>
+              <a:rPr lang="en-US" sz="2400" spc="13" dirty="0" smtClean="0">
+                <a:solidFill>
+                  <a:srgbClr val="231F20"/>
+                </a:solidFill>
+                <a:latin typeface="Arial" panose="020B0604020202020204" pitchFamily="34" charset="0"/>
+                <a:cs typeface="Arial" panose="020B0604020202020204" pitchFamily="34" charset="0"/>
+              </a:rPr>
+              <a:t>Visualization</a:t>
+            </a:r>
           </a:p>
         </p:txBody>
       </p:sp>
@@ -5640,8 +5972,8 @@
         </p:nvSpPr>
         <p:spPr>
           <a:xfrm>
-            <a:off x="8768459" y="3609284"/>
-            <a:ext cx="7643984" cy="714811"/>
+            <a:off x="8768459" y="7435260"/>
+            <a:ext cx="7643984" cy="2123210"/>
           </a:xfrm>
           <a:prstGeom prst="rect">
             <a:avLst/>
@@ -5662,14 +5994,55 @@
               </a:spcBef>
             </a:pPr>
             <a:r>
-              <a:rPr lang="en-US" sz="2400" spc="13" dirty="0" smtClean="0">
-                <a:solidFill>
-                  <a:srgbClr val="231F20"/>
+              <a:rPr lang="en-US" sz="3200" b="1" spc="13" dirty="0" smtClean="0">
+                <a:solidFill>
+                  <a:schemeClr val="tx1">
+                    <a:lumMod val="75000"/>
+                    <a:lumOff val="25000"/>
+                  </a:schemeClr>
                 </a:solidFill>
                 <a:latin typeface="Arial"/>
                 <a:cs typeface="Arial"/>
               </a:rPr>
-              <a:t>------- TODO: machine learning -----------</a:t>
+              <a:t>Machine Learning Results</a:t>
+            </a:r>
+          </a:p>
+          <a:p>
+            <a:pPr marL="359070" marR="8084" indent="-342900">
+              <a:lnSpc>
+                <a:spcPct val="102899"/>
+              </a:lnSpc>
+              <a:spcBef>
+                <a:spcPts val="256"/>
+              </a:spcBef>
+              <a:buFont typeface="Arial" panose="020B0604020202020204" pitchFamily="34" charset="0"/>
+              <a:buChar char="•"/>
+            </a:pPr>
+            <a:r>
+              <a:rPr lang="en-US" sz="2400" dirty="0" smtClean="0">
+                <a:latin typeface="Arial"/>
+                <a:cs typeface="Arial"/>
+              </a:rPr>
+              <a:t>Support Vector Machines best for &lt;10,000 training tweets</a:t>
+            </a:r>
+          </a:p>
+          <a:p>
+            <a:pPr marL="359070" marR="8084" indent="-342900">
+              <a:lnSpc>
+                <a:spcPct val="102899"/>
+              </a:lnSpc>
+              <a:spcBef>
+                <a:spcPts val="256"/>
+              </a:spcBef>
+              <a:buFont typeface="Arial" panose="020B0604020202020204" pitchFamily="34" charset="0"/>
+              <a:buChar char="•"/>
+            </a:pPr>
+            <a:r>
+              <a:rPr lang="en-US" sz="2400" dirty="0" smtClean="0">
+                <a:latin typeface="Arial"/>
+                <a:cs typeface="Arial"/>
+              </a:rPr>
+              <a:t>Naïve Bayes fastest; trained on 1.6 million tweets</a:t>
             </a:r>
             <a:endParaRPr lang="en-US" sz="2400" dirty="0">
               <a:latin typeface="Arial"/>
@@ -5700,8 +6073,8 @@
         </p:nvSpPr>
         <p:spPr>
           <a:xfrm>
-            <a:off x="8620103" y="5348084"/>
-            <a:ext cx="7643984" cy="1687706"/>
+            <a:off x="8620102" y="9692101"/>
+            <a:ext cx="7643984" cy="553998"/>
           </a:xfrm>
           <a:prstGeom prst="rect">
             <a:avLst/>
@@ -5722,31 +6095,263 @@
                 <a:latin typeface="Arial"/>
                 <a:cs typeface="Arial"/>
               </a:rPr>
-              <a:t>BACK END</a:t>
+              <a:t>BACK </a:t>
+            </a:r>
+            <a:r>
+              <a:rPr lang="en-US" sz="3600" b="1" dirty="0" smtClean="0">
+                <a:solidFill>
+                  <a:srgbClr val="231F20"/>
+                </a:solidFill>
+                <a:latin typeface="Arial"/>
+                <a:cs typeface="Arial"/>
+              </a:rPr>
+              <a:t>END</a:t>
             </a:r>
             <a:endParaRPr sz="3600" dirty="0">
               <a:latin typeface="Arial"/>
               <a:cs typeface="Arial"/>
             </a:endParaRPr>
           </a:p>
-          <a:p>
-            <a:pPr marL="16170" marR="8084">
+        </p:txBody>
+      </p:sp>
+      <p:graphicFrame>
+        <p:nvGraphicFramePr>
+          <p:cNvPr id="77" name="Chart 76"/>
+          <p:cNvGraphicFramePr>
+            <a:graphicFrameLocks/>
+          </p:cNvGraphicFramePr>
+          <p:nvPr>
+            <p:extLst>
+              <p:ext uri="{D42A27DB-BD31-4B8C-83A1-F6EECF244321}">
+                <p14:modId xmlns:p14="http://schemas.microsoft.com/office/powerpoint/2010/main" val="2265079235"/>
+              </p:ext>
+            </p:extLst>
+          </p:nvPr>
+        </p:nvGraphicFramePr>
+        <p:xfrm>
+          <a:off x="8618454" y="3639780"/>
+          <a:ext cx="7732887" cy="3476020"/>
+        </p:xfrm>
+        <a:graphic>
+          <a:graphicData uri="http://schemas.openxmlformats.org/drawingml/2006/chart">
+            <c:chart xmlns:c="http://schemas.openxmlformats.org/drawingml/2006/chart" xmlns:r="http://schemas.openxmlformats.org/officeDocument/2006/relationships" r:id="rId3"/>
+          </a:graphicData>
+        </a:graphic>
+      </p:graphicFrame>
+      <p:sp>
+        <p:nvSpPr>
+          <p:cNvPr id="84" name="object 3"/>
+          <p:cNvSpPr txBox="1"/>
+          <p:nvPr/>
+        </p:nvSpPr>
+        <p:spPr>
+          <a:xfrm>
+            <a:off x="16885117" y="14460376"/>
+            <a:ext cx="7653799" cy="3647089"/>
+          </a:xfrm>
+          <a:prstGeom prst="rect">
+            <a:avLst/>
+          </a:prstGeom>
+        </p:spPr>
+        <p:txBody>
+          <a:bodyPr vert="horz" wrap="square" lIns="0" tIns="0" rIns="0" bIns="0" rtlCol="0">
+            <a:spAutoFit/>
+          </a:bodyPr>
+          <a:lstStyle/>
+          <a:p>
+            <a:pPr marL="359070" marR="8084" indent="-342900">
               <a:lnSpc>
                 <a:spcPct val="102899"/>
               </a:lnSpc>
               <a:spcBef>
                 <a:spcPts val="256"/>
               </a:spcBef>
+              <a:buFont typeface="Arial" panose="020B0604020202020204" pitchFamily="34" charset="0"/>
+              <a:buChar char="•"/>
             </a:pPr>
             <a:r>
-              <a:rPr lang="en-US" sz="2400" spc="13" dirty="0" err="1">
+              <a:rPr lang="en-US" sz="2400" spc="13" dirty="0" smtClean="0">
                 <a:solidFill>
                   <a:srgbClr val="231F20"/>
                 </a:solidFill>
                 <a:latin typeface="Arial"/>
                 <a:cs typeface="Arial"/>
               </a:rPr>
-              <a:t>abcdeabcdeabcdeabcdeabcdeabcdeabcdeabcdeabcdeabcdeabcdeabcde</a:t>
+              <a:t>Online visualization tool for Twitter sentiments</a:t>
+            </a:r>
+          </a:p>
+          <a:p>
+            <a:pPr marL="1456262" marR="8084" lvl="1" indent="-342900">
+              <a:lnSpc>
+                <a:spcPct val="102899"/>
+              </a:lnSpc>
+              <a:spcBef>
+                <a:spcPts val="256"/>
+              </a:spcBef>
+              <a:buFont typeface="Arial" panose="020B0604020202020204" pitchFamily="34" charset="0"/>
+              <a:buChar char="•"/>
+            </a:pPr>
+            <a:r>
+              <a:rPr lang="en-US" sz="2400" spc="13" dirty="0" smtClean="0">
+                <a:solidFill>
+                  <a:srgbClr val="231F20"/>
+                </a:solidFill>
+                <a:latin typeface="Arial"/>
+                <a:cs typeface="Arial"/>
+              </a:rPr>
+              <a:t>“State” Map</a:t>
+            </a:r>
+          </a:p>
+          <a:p>
+            <a:pPr marL="1456262" marR="8084" lvl="1" indent="-342900">
+              <a:lnSpc>
+                <a:spcPct val="102899"/>
+              </a:lnSpc>
+              <a:spcBef>
+                <a:spcPts val="256"/>
+              </a:spcBef>
+              <a:buFont typeface="Arial" panose="020B0604020202020204" pitchFamily="34" charset="0"/>
+              <a:buChar char="•"/>
+            </a:pPr>
+            <a:r>
+              <a:rPr lang="en-US" sz="2400" spc="13" dirty="0" smtClean="0">
+                <a:solidFill>
+                  <a:srgbClr val="231F20"/>
+                </a:solidFill>
+                <a:latin typeface="Arial"/>
+                <a:cs typeface="Arial"/>
+              </a:rPr>
+              <a:t>Heat Map</a:t>
+            </a:r>
+          </a:p>
+          <a:p>
+            <a:pPr marL="359070" marR="8084" indent="-342900">
+              <a:lnSpc>
+                <a:spcPct val="102899"/>
+              </a:lnSpc>
+              <a:spcBef>
+                <a:spcPts val="256"/>
+              </a:spcBef>
+              <a:buFont typeface="Arial" panose="020B0604020202020204" pitchFamily="34" charset="0"/>
+              <a:buChar char="•"/>
+            </a:pPr>
+            <a:r>
+              <a:rPr lang="en-US" sz="2400" spc="13" dirty="0" smtClean="0">
+                <a:solidFill>
+                  <a:srgbClr val="231F20"/>
+                </a:solidFill>
+                <a:latin typeface="Arial"/>
+                <a:cs typeface="Arial"/>
+              </a:rPr>
+              <a:t>Trending topic analysis</a:t>
+            </a:r>
+          </a:p>
+          <a:p>
+            <a:pPr marL="1456262" marR="8084" lvl="1" indent="-342900">
+              <a:lnSpc>
+                <a:spcPct val="102899"/>
+              </a:lnSpc>
+              <a:spcBef>
+                <a:spcPts val="256"/>
+              </a:spcBef>
+              <a:buFont typeface="Arial" panose="020B0604020202020204" pitchFamily="34" charset="0"/>
+              <a:buChar char="•"/>
+            </a:pPr>
+            <a:r>
+              <a:rPr lang="en-US" sz="2400" spc="13" dirty="0" smtClean="0">
+                <a:solidFill>
+                  <a:srgbClr val="231F20"/>
+                </a:solidFill>
+                <a:latin typeface="Arial"/>
+                <a:cs typeface="Arial"/>
+              </a:rPr>
+              <a:t>Interactivity</a:t>
+            </a:r>
+          </a:p>
+          <a:p>
+            <a:pPr marL="359070" marR="8084" indent="-342900">
+              <a:lnSpc>
+                <a:spcPct val="102899"/>
+              </a:lnSpc>
+              <a:spcBef>
+                <a:spcPts val="256"/>
+              </a:spcBef>
+              <a:buFont typeface="Arial" panose="020B0604020202020204" pitchFamily="34" charset="0"/>
+              <a:buChar char="•"/>
+            </a:pPr>
+            <a:r>
+              <a:rPr lang="en-US" sz="2400" spc="13" dirty="0" smtClean="0">
+                <a:solidFill>
+                  <a:srgbClr val="231F20"/>
+                </a:solidFill>
+                <a:latin typeface="Arial"/>
+                <a:cs typeface="Arial"/>
+              </a:rPr>
+              <a:t>“State” Map</a:t>
+            </a:r>
+          </a:p>
+          <a:p>
+            <a:pPr marL="1456262" marR="8084" lvl="1" indent="-342900">
+              <a:lnSpc>
+                <a:spcPct val="102899"/>
+              </a:lnSpc>
+              <a:spcBef>
+                <a:spcPts val="256"/>
+              </a:spcBef>
+              <a:buFont typeface="Arial" panose="020B0604020202020204" pitchFamily="34" charset="0"/>
+              <a:buChar char="•"/>
+            </a:pPr>
+            <a:r>
+              <a:rPr lang="en-US" sz="2400" spc="13" dirty="0" smtClean="0">
+                <a:solidFill>
+                  <a:srgbClr val="231F20"/>
+                </a:solidFill>
+                <a:latin typeface="Arial"/>
+                <a:cs typeface="Arial"/>
+              </a:rPr>
+              <a:t>Average sentiments of last </a:t>
+            </a:r>
+            <a:r>
+              <a:rPr lang="en-US" sz="2400" b="1" spc="13" dirty="0" smtClean="0">
+                <a:solidFill>
+                  <a:srgbClr val="231F20"/>
+                </a:solidFill>
+                <a:latin typeface="Arial"/>
+                <a:cs typeface="Arial"/>
+              </a:rPr>
+              <a:t>n</a:t>
+            </a:r>
+            <a:r>
+              <a:rPr lang="en-US" sz="2400" spc="13" dirty="0" smtClean="0">
+                <a:solidFill>
+                  <a:srgbClr val="231F20"/>
+                </a:solidFill>
+                <a:latin typeface="Arial"/>
+                <a:cs typeface="Arial"/>
+              </a:rPr>
+              <a:t> tweets</a:t>
+            </a:r>
+          </a:p>
+          <a:p>
+            <a:pPr marL="359070" marR="8084" indent="-342900">
+              <a:lnSpc>
+                <a:spcPct val="102899"/>
+              </a:lnSpc>
+              <a:spcBef>
+                <a:spcPts val="256"/>
+              </a:spcBef>
+              <a:buFont typeface="Arial" panose="020B0604020202020204" pitchFamily="34" charset="0"/>
+              <a:buChar char="•"/>
+            </a:pPr>
+            <a:r>
+              <a:rPr lang="en-US" sz="2400" spc="13" dirty="0" smtClean="0">
+                <a:solidFill>
+                  <a:srgbClr val="231F20"/>
+                </a:solidFill>
+                <a:latin typeface="Arial"/>
+                <a:cs typeface="Arial"/>
+              </a:rPr>
+              <a:t>Google Maps API</a:t>
             </a:r>
             <a:endParaRPr lang="en-US" sz="2400" dirty="0">
               <a:latin typeface="Arial"/>
@@ -5769,168 +6374,36 @@
           </a:p>
         </p:txBody>
       </p:sp>
-      <p:graphicFrame>
-        <p:nvGraphicFramePr>
-          <p:cNvPr id="77" name="Chart 76"/>
-          <p:cNvGraphicFramePr>
-            <a:graphicFrameLocks/>
-          </p:cNvGraphicFramePr>
-          <p:nvPr>
-            <p:extLst>
-              <p:ext uri="{D42A27DB-BD31-4B8C-83A1-F6EECF244321}">
-                <p14:modId xmlns:p14="http://schemas.microsoft.com/office/powerpoint/2010/main" val="958377775"/>
-              </p:ext>
-            </p:extLst>
-          </p:nvPr>
-        </p:nvGraphicFramePr>
-        <p:xfrm>
-          <a:off x="769872" y="13814956"/>
-          <a:ext cx="7732887" cy="3476020"/>
-        </p:xfrm>
-        <a:graphic>
-          <a:graphicData uri="http://schemas.openxmlformats.org/drawingml/2006/chart">
-            <c:chart xmlns:c="http://schemas.openxmlformats.org/drawingml/2006/chart" xmlns:r="http://schemas.openxmlformats.org/officeDocument/2006/relationships" r:id="rId3"/>
-          </a:graphicData>
-        </a:graphic>
-      </p:graphicFrame>
-      <p:sp>
-        <p:nvSpPr>
-          <p:cNvPr id="78" name="Rectangle 77"/>
-          <p:cNvSpPr/>
+      <p:sp>
+        <p:nvSpPr>
+          <p:cNvPr id="88" name="object 3"/>
+          <p:cNvSpPr txBox="1"/>
           <p:nvPr/>
         </p:nvSpPr>
         <p:spPr>
           <a:xfrm>
-            <a:off x="16885117" y="4304583"/>
-            <a:ext cx="7653799" cy="4419600"/>
+            <a:off x="8554674" y="16563269"/>
+            <a:ext cx="7672607" cy="1218219"/>
           </a:xfrm>
           <a:prstGeom prst="rect">
             <a:avLst/>
           </a:prstGeom>
         </p:spPr>
-        <p:style>
-          <a:lnRef idx="2">
-            <a:schemeClr val="accent1">
-              <a:shade val="50000"/>
-            </a:schemeClr>
-          </a:lnRef>
-          <a:fillRef idx="1">
-            <a:schemeClr val="accent1"/>
-          </a:fillRef>
-          <a:effectRef idx="0">
-            <a:schemeClr val="accent1"/>
-          </a:effectRef>
-          <a:fontRef idx="minor">
-            <a:schemeClr val="lt1"/>
-          </a:fontRef>
-        </p:style>
-        <p:txBody>
-          <a:bodyPr rtlCol="0" anchor="ctr"/>
-          <a:lstStyle/>
-          <a:p>
-            <a:pPr algn="ctr"/>
-            <a:endParaRPr lang="en-US"/>
-          </a:p>
-        </p:txBody>
-      </p:sp>
-      <p:sp>
-        <p:nvSpPr>
-          <p:cNvPr id="79" name="TextBox 78"/>
-          <p:cNvSpPr txBox="1"/>
-          <p:nvPr/>
-        </p:nvSpPr>
-        <p:spPr>
-          <a:xfrm>
-            <a:off x="18006916" y="5976139"/>
-            <a:ext cx="5410200" cy="757130"/>
-          </a:xfrm>
-          <a:prstGeom prst="rect">
-            <a:avLst/>
-          </a:prstGeom>
-          <a:noFill/>
-        </p:spPr>
-        <p:txBody>
-          <a:bodyPr wrap="square" rtlCol="0">
-            <a:spAutoFit/>
-          </a:bodyPr>
-          <a:lstStyle/>
-          <a:p>
-            <a:r>
-              <a:rPr lang="en-US" dirty="0" smtClean="0"/>
-              <a:t>Website image</a:t>
-            </a:r>
-            <a:endParaRPr lang="en-US" dirty="0"/>
-          </a:p>
-        </p:txBody>
-      </p:sp>
-      <p:sp>
-        <p:nvSpPr>
-          <p:cNvPr id="82" name="Rectangle 81"/>
-          <p:cNvSpPr/>
-          <p:nvPr/>
-        </p:nvSpPr>
-        <p:spPr>
-          <a:xfrm>
-            <a:off x="8620103" y="7107385"/>
-            <a:ext cx="7672607" cy="3193107"/>
-          </a:xfrm>
-          <a:prstGeom prst="rect">
-            <a:avLst/>
-          </a:prstGeom>
-        </p:spPr>
-        <p:style>
-          <a:lnRef idx="2">
-            <a:schemeClr val="accent1">
-              <a:shade val="50000"/>
-            </a:schemeClr>
-          </a:lnRef>
-          <a:fillRef idx="1">
-            <a:schemeClr val="accent1"/>
-          </a:fillRef>
-          <a:effectRef idx="0">
-            <a:schemeClr val="accent1"/>
-          </a:effectRef>
-          <a:fontRef idx="minor">
-            <a:schemeClr val="lt1"/>
-          </a:fontRef>
-        </p:style>
-        <p:txBody>
-          <a:bodyPr rtlCol="0" anchor="ctr"/>
-          <a:lstStyle/>
-          <a:p>
-            <a:pPr algn="ctr"/>
-            <a:endParaRPr lang="en-US"/>
-          </a:p>
-        </p:txBody>
-      </p:sp>
-      <p:sp>
-        <p:nvSpPr>
-          <p:cNvPr id="84" name="object 3"/>
-          <p:cNvSpPr txBox="1"/>
-          <p:nvPr/>
-        </p:nvSpPr>
-        <p:spPr>
-          <a:xfrm>
-            <a:off x="16885117" y="12012146"/>
-            <a:ext cx="7653799" cy="714811"/>
-          </a:xfrm>
-          <a:prstGeom prst="rect">
-            <a:avLst/>
-          </a:prstGeom>
-        </p:spPr>
         <p:txBody>
           <a:bodyPr vert="horz" wrap="square" lIns="0" tIns="0" rIns="0" bIns="0" rtlCol="0">
             <a:spAutoFit/>
           </a:bodyPr>
           <a:lstStyle/>
           <a:p>
-            <a:pPr marL="16170" marR="8084">
+            <a:pPr marL="359070" marR="8084" indent="-342900">
               <a:lnSpc>
                 <a:spcPct val="102899"/>
               </a:lnSpc>
               <a:spcBef>
                 <a:spcPts val="256"/>
               </a:spcBef>
+              <a:buFont typeface="Arial" panose="020B0604020202020204" pitchFamily="34" charset="0"/>
+              <a:buChar char="•"/>
             </a:pPr>
             <a:r>
               <a:rPr lang="en-US" sz="2400" spc="13" dirty="0" smtClean="0">
@@ -5940,7 +6413,268 @@
                 <a:latin typeface="Arial"/>
                 <a:cs typeface="Arial"/>
               </a:rPr>
-              <a:t>------- TODO: final product description -----------</a:t>
+              <a:t>Two data streams</a:t>
+            </a:r>
+          </a:p>
+          <a:p>
+            <a:pPr marL="1456262" marR="8084" lvl="1" indent="-342900">
+              <a:lnSpc>
+                <a:spcPct val="102899"/>
+              </a:lnSpc>
+              <a:spcBef>
+                <a:spcPts val="256"/>
+              </a:spcBef>
+              <a:buFont typeface="Arial" panose="020B0604020202020204" pitchFamily="34" charset="0"/>
+              <a:buChar char="•"/>
+            </a:pPr>
+            <a:r>
+              <a:rPr lang="en-US" sz="2400" spc="13" dirty="0" smtClean="0">
+                <a:solidFill>
+                  <a:srgbClr val="231F20"/>
+                </a:solidFill>
+                <a:latin typeface="Arial"/>
+                <a:cs typeface="Arial"/>
+              </a:rPr>
+              <a:t>“General” and “Trending”</a:t>
+            </a:r>
+          </a:p>
+          <a:p>
+            <a:pPr marL="1456262" marR="8084" lvl="1" indent="-342900">
+              <a:lnSpc>
+                <a:spcPct val="102899"/>
+              </a:lnSpc>
+              <a:spcBef>
+                <a:spcPts val="256"/>
+              </a:spcBef>
+              <a:buFont typeface="Arial" panose="020B0604020202020204" pitchFamily="34" charset="0"/>
+              <a:buChar char="•"/>
+            </a:pPr>
+            <a:r>
+              <a:rPr lang="en-US" sz="2400" spc="13" dirty="0" smtClean="0">
+                <a:solidFill>
+                  <a:srgbClr val="231F20"/>
+                </a:solidFill>
+                <a:latin typeface="Arial"/>
+                <a:cs typeface="Arial"/>
+              </a:rPr>
+              <a:t>Raw tweets saved in cache</a:t>
+            </a:r>
+            <a:endParaRPr lang="en-US" sz="1867" dirty="0">
+              <a:latin typeface="Arial"/>
+              <a:cs typeface="Arial"/>
+            </a:endParaRPr>
+          </a:p>
+        </p:txBody>
+      </p:sp>
+      <p:pic>
+        <p:nvPicPr>
+          <p:cNvPr id="1026" name="Picture 2" descr="https://lh4.googleusercontent.com/wacdfRHxqO4aYfecSz_-v39G1B8kPwxLczzNawmhQHGcICTaPhur4savYExnzDui9yock9k8bKCdT8-iZZ_rHltcsbGInGMmSmMZfxUaBm8bYslTy_ksJd49M-VjIFTfFmXa"/>
+          <p:cNvPicPr>
+            <a:picLocks noChangeAspect="1" noChangeArrowheads="1"/>
+          </p:cNvPicPr>
+          <p:nvPr/>
+        </p:nvPicPr>
+        <p:blipFill>
+          <a:blip r:embed="rId4">
+            <a:extLst>
+              <a:ext uri="{28A0092B-C50C-407E-A947-70E740481C1C}">
+                <a14:useLocalDpi xmlns:a14="http://schemas.microsoft.com/office/drawing/2010/main" val="0"/>
+              </a:ext>
+            </a:extLst>
+          </a:blip>
+          <a:srcRect/>
+          <a:stretch>
+            <a:fillRect/>
+          </a:stretch>
+        </p:blipFill>
+        <p:spPr bwMode="auto">
+          <a:xfrm>
+            <a:off x="8619344" y="10231318"/>
+            <a:ext cx="5693836" cy="5343344"/>
+          </a:xfrm>
+          <a:prstGeom prst="rect">
+            <a:avLst/>
+          </a:prstGeom>
+          <a:noFill/>
+          <a:extLst>
+            <a:ext uri="{909E8E84-426E-40DD-AFC4-6F175D3DCCD1}">
+              <a14:hiddenFill xmlns:a14="http://schemas.microsoft.com/office/drawing/2010/main">
+                <a:solidFill>
+                  <a:srgbClr val="FFFFFF"/>
+                </a:solidFill>
+              </a14:hiddenFill>
+            </a:ext>
+          </a:extLst>
+        </p:spPr>
+      </p:pic>
+      <p:pic>
+        <p:nvPicPr>
+          <p:cNvPr id="1030" name="Picture 6" descr="Screen Shot 2014-05-23 at 9.17.24 PM.png"/>
+          <p:cNvPicPr>
+            <a:picLocks noChangeAspect="1" noChangeArrowheads="1"/>
+          </p:cNvPicPr>
+          <p:nvPr/>
+        </p:nvPicPr>
+        <p:blipFill>
+          <a:blip r:embed="rId5">
+            <a:extLst>
+              <a:ext uri="{28A0092B-C50C-407E-A947-70E740481C1C}">
+                <a14:useLocalDpi xmlns:a14="http://schemas.microsoft.com/office/drawing/2010/main" val="0"/>
+              </a:ext>
+            </a:extLst>
+          </a:blip>
+          <a:srcRect/>
+          <a:stretch>
+            <a:fillRect/>
+          </a:stretch>
+        </p:blipFill>
+        <p:spPr bwMode="auto">
+          <a:xfrm>
+            <a:off x="16743933" y="7018149"/>
+            <a:ext cx="7794983" cy="4876736"/>
+          </a:xfrm>
+          <a:prstGeom prst="rect">
+            <a:avLst/>
+          </a:prstGeom>
+          <a:noFill/>
+          <a:extLst>
+            <a:ext uri="{909E8E84-426E-40DD-AFC4-6F175D3DCCD1}">
+              <a14:hiddenFill xmlns:a14="http://schemas.microsoft.com/office/drawing/2010/main">
+                <a:solidFill>
+                  <a:srgbClr val="FFFFFF"/>
+                </a:solidFill>
+              </a14:hiddenFill>
+            </a:ext>
+          </a:extLst>
+        </p:spPr>
+      </p:pic>
+      <p:sp>
+        <p:nvSpPr>
+          <p:cNvPr id="38" name="object 3"/>
+          <p:cNvSpPr txBox="1"/>
+          <p:nvPr/>
+        </p:nvSpPr>
+        <p:spPr>
+          <a:xfrm>
+            <a:off x="16911854" y="3583976"/>
+            <a:ext cx="7672607" cy="2770823"/>
+          </a:xfrm>
+          <a:prstGeom prst="rect">
+            <a:avLst/>
+          </a:prstGeom>
+        </p:spPr>
+        <p:txBody>
+          <a:bodyPr vert="horz" wrap="square" lIns="0" tIns="0" rIns="0" bIns="0" rtlCol="0">
+            <a:spAutoFit/>
+          </a:bodyPr>
+          <a:lstStyle/>
+          <a:p>
+            <a:pPr marL="359070" marR="8084" indent="-342900">
+              <a:lnSpc>
+                <a:spcPct val="102899"/>
+              </a:lnSpc>
+              <a:spcBef>
+                <a:spcPts val="256"/>
+              </a:spcBef>
+              <a:buFont typeface="Arial" panose="020B0604020202020204" pitchFamily="34" charset="0"/>
+              <a:buChar char="•"/>
+            </a:pPr>
+            <a:r>
+              <a:rPr lang="en-US" sz="2400" dirty="0" smtClean="0">
+                <a:latin typeface="Arial"/>
+                <a:cs typeface="Arial"/>
+              </a:rPr>
+              <a:t>Natural Language Processing categorizers perform sentiment analysis on raw Tweets</a:t>
+            </a:r>
+          </a:p>
+          <a:p>
+            <a:pPr marL="359070" marR="8084" indent="-342900">
+              <a:lnSpc>
+                <a:spcPct val="102899"/>
+              </a:lnSpc>
+              <a:spcBef>
+                <a:spcPts val="256"/>
+              </a:spcBef>
+              <a:buFont typeface="Arial" panose="020B0604020202020204" pitchFamily="34" charset="0"/>
+              <a:buChar char="•"/>
+            </a:pPr>
+            <a:r>
+              <a:rPr lang="en-US" sz="2400" dirty="0" smtClean="0">
+                <a:latin typeface="Arial"/>
+                <a:cs typeface="Arial"/>
+              </a:rPr>
+              <a:t>Middleware serves processed Tweets to clients</a:t>
+            </a:r>
+          </a:p>
+          <a:p>
+            <a:pPr marL="359070" marR="8084" indent="-342900">
+              <a:lnSpc>
+                <a:spcPct val="102899"/>
+              </a:lnSpc>
+              <a:spcBef>
+                <a:spcPts val="256"/>
+              </a:spcBef>
+              <a:buFont typeface="Arial" panose="020B0604020202020204" pitchFamily="34" charset="0"/>
+              <a:buChar char="•"/>
+            </a:pPr>
+            <a:r>
+              <a:rPr lang="en-US" sz="2400" dirty="0" smtClean="0">
+                <a:latin typeface="Arial"/>
+                <a:cs typeface="Arial"/>
+              </a:rPr>
+              <a:t>Structure</a:t>
+            </a:r>
+          </a:p>
+          <a:p>
+            <a:pPr marL="1456262" marR="8084" lvl="1" indent="-342900">
+              <a:lnSpc>
+                <a:spcPct val="102899"/>
+              </a:lnSpc>
+              <a:spcBef>
+                <a:spcPts val="256"/>
+              </a:spcBef>
+              <a:buFont typeface="Arial" panose="020B0604020202020204" pitchFamily="34" charset="0"/>
+              <a:buChar char="•"/>
+            </a:pPr>
+            <a:r>
+              <a:rPr lang="en-US" sz="2400" dirty="0" smtClean="0">
+                <a:latin typeface="Arial"/>
+                <a:cs typeface="Arial"/>
+              </a:rPr>
+              <a:t>Using </a:t>
+            </a:r>
+            <a:r>
+              <a:rPr lang="en-US" sz="2400" dirty="0" err="1" smtClean="0">
+                <a:latin typeface="Arial"/>
+                <a:cs typeface="Arial"/>
+              </a:rPr>
+              <a:t>Redis</a:t>
+            </a:r>
+            <a:r>
+              <a:rPr lang="en-US" sz="2400" dirty="0" smtClean="0">
+                <a:latin typeface="Arial"/>
+                <a:cs typeface="Arial"/>
+              </a:rPr>
+              <a:t> as a cache</a:t>
+            </a:r>
+          </a:p>
+          <a:p>
+            <a:pPr marL="1456262" marR="8084" lvl="1" indent="-342900">
+              <a:lnSpc>
+                <a:spcPct val="102899"/>
+              </a:lnSpc>
+              <a:spcBef>
+                <a:spcPts val="256"/>
+              </a:spcBef>
+              <a:buFont typeface="Arial" panose="020B0604020202020204" pitchFamily="34" charset="0"/>
+              <a:buChar char="•"/>
+            </a:pPr>
+            <a:r>
+              <a:rPr lang="en-US" sz="2400" dirty="0" smtClean="0">
+                <a:latin typeface="Arial"/>
+                <a:cs typeface="Arial"/>
+              </a:rPr>
+              <a:t>Python/Node.js</a:t>
             </a:r>
             <a:endParaRPr lang="en-US" sz="2400" dirty="0">
               <a:latin typeface="Arial"/>
@@ -5963,236 +6697,110 @@
           </a:p>
         </p:txBody>
       </p:sp>
-      <p:sp>
-        <p:nvSpPr>
-          <p:cNvPr id="85" name="TextBox 84"/>
-          <p:cNvSpPr txBox="1"/>
+      <p:pic>
+        <p:nvPicPr>
+          <p:cNvPr id="1034" name="Picture 10" descr="countymaprb1024.png"/>
+          <p:cNvPicPr>
+            <a:picLocks noChangeAspect="1" noChangeArrowheads="1"/>
+          </p:cNvPicPr>
           <p:nvPr/>
-        </p:nvSpPr>
-        <p:spPr>
+        </p:nvPicPr>
+        <p:blipFill>
+          <a:blip r:embed="rId6" cstate="print">
+            <a:extLst>
+              <a:ext uri="{28A0092B-C50C-407E-A947-70E740481C1C}">
+                <a14:useLocalDpi xmlns:a14="http://schemas.microsoft.com/office/drawing/2010/main" val="0"/>
+              </a:ext>
+            </a:extLst>
+          </a:blip>
+          <a:srcRect/>
+          <a:stretch>
+            <a:fillRect/>
+          </a:stretch>
+        </p:blipFill>
+        <p:spPr bwMode="auto">
           <a:xfrm>
-            <a:off x="8991458" y="7664103"/>
-            <a:ext cx="5257052" cy="757130"/>
+            <a:off x="718608" y="7221349"/>
+            <a:ext cx="2555748" cy="1724631"/>
           </a:xfrm>
           <a:prstGeom prst="rect">
             <a:avLst/>
           </a:prstGeom>
           <a:noFill/>
+          <a:extLst>
+            <a:ext uri="{909E8E84-426E-40DD-AFC4-6F175D3DCCD1}">
+              <a14:hiddenFill xmlns:a14="http://schemas.microsoft.com/office/drawing/2010/main">
+                <a:solidFill>
+                  <a:srgbClr val="FFFFFF"/>
+                </a:solidFill>
+              </a14:hiddenFill>
+            </a:ext>
+          </a:extLst>
         </p:spPr>
-        <p:txBody>
-          <a:bodyPr wrap="square" rtlCol="0">
-            <a:spAutoFit/>
-          </a:bodyPr>
-          <a:lstStyle/>
-          <a:p>
-            <a:r>
-              <a:rPr lang="en-US" dirty="0" smtClean="0"/>
-              <a:t>Back end image</a:t>
-            </a:r>
-            <a:endParaRPr lang="en-US" dirty="0"/>
-          </a:p>
-        </p:txBody>
-      </p:sp>
-      <p:sp>
-        <p:nvSpPr>
-          <p:cNvPr id="88" name="object 3"/>
-          <p:cNvSpPr txBox="1"/>
+      </p:pic>
+      <p:sp>
+        <p:nvSpPr>
+          <p:cNvPr id="3" name="Rectangle 2"/>
+          <p:cNvSpPr/>
           <p:nvPr/>
         </p:nvSpPr>
         <p:spPr>
           <a:xfrm>
-            <a:off x="8620102" y="13293889"/>
-            <a:ext cx="7672607" cy="714811"/>
+            <a:off x="3704749" y="6554366"/>
+            <a:ext cx="794705" cy="2296013"/>
           </a:xfrm>
           <a:prstGeom prst="rect">
             <a:avLst/>
           </a:prstGeom>
         </p:spPr>
         <p:txBody>
-          <a:bodyPr vert="horz" wrap="square" lIns="0" tIns="0" rIns="0" bIns="0" rtlCol="0">
+          <a:bodyPr wrap="square">
             <a:spAutoFit/>
           </a:bodyPr>
           <a:lstStyle/>
           <a:p>
-            <a:pPr marL="16170" marR="8084">
-              <a:lnSpc>
-                <a:spcPct val="102899"/>
-              </a:lnSpc>
-              <a:spcBef>
-                <a:spcPts val="256"/>
-              </a:spcBef>
-            </a:pPr>
-            <a:r>
-              <a:rPr lang="en-US" sz="2400" spc="13" dirty="0" smtClean="0">
-                <a:solidFill>
-                  <a:srgbClr val="231F20"/>
-                </a:solidFill>
-                <a:latin typeface="Arial"/>
-                <a:cs typeface="Arial"/>
-              </a:rPr>
-              <a:t>------- TODO: back end description -----------</a:t>
-            </a:r>
-            <a:endParaRPr lang="en-US" sz="2400" dirty="0">
-              <a:latin typeface="Arial"/>
-              <a:cs typeface="Arial"/>
-            </a:endParaRPr>
-          </a:p>
-          <a:p>
-            <a:pPr marL="16170" marR="8084">
-              <a:lnSpc>
-                <a:spcPct val="102899"/>
-              </a:lnSpc>
-              <a:spcBef>
-                <a:spcPts val="256"/>
-              </a:spcBef>
-            </a:pPr>
-            <a:endParaRPr lang="en-US" sz="1867" dirty="0">
-              <a:latin typeface="Arial"/>
-              <a:cs typeface="Arial"/>
-            </a:endParaRPr>
-          </a:p>
-        </p:txBody>
-      </p:sp>
-      <p:sp>
-        <p:nvSpPr>
-          <p:cNvPr id="89" name="Rectangle 88"/>
-          <p:cNvSpPr/>
+            <a:r>
+              <a:rPr lang="en-US" dirty="0"/>
+              <a:t> </a:t>
+            </a:r>
+            <a:r>
+              <a:rPr lang="en-US" sz="10000" b="1" dirty="0" smtClean="0"/>
+              <a:t>+</a:t>
+            </a:r>
+            <a:endParaRPr lang="en-US" sz="10000" b="1" dirty="0"/>
+          </a:p>
+        </p:txBody>
+      </p:sp>
+      <p:pic>
+        <p:nvPicPr>
+          <p:cNvPr id="10" name="Picture 9"/>
+          <p:cNvPicPr>
+            <a:picLocks noChangeAspect="1"/>
+          </p:cNvPicPr>
           <p:nvPr/>
-        </p:nvSpPr>
+        </p:nvPicPr>
+        <p:blipFill>
+          <a:blip r:embed="rId7">
+            <a:extLst>
+              <a:ext uri="{28A0092B-C50C-407E-A947-70E740481C1C}">
+                <a14:useLocalDpi xmlns:a14="http://schemas.microsoft.com/office/drawing/2010/main" val="0"/>
+              </a:ext>
+            </a:extLst>
+          </a:blip>
+          <a:stretch>
+            <a:fillRect/>
+          </a:stretch>
+        </p:blipFill>
         <p:spPr>
           <a:xfrm>
-            <a:off x="16885117" y="8885322"/>
-            <a:ext cx="7653799" cy="2907839"/>
+            <a:off x="5095157" y="7221349"/>
+            <a:ext cx="1835050" cy="1724631"/>
           </a:xfrm>
           <a:prstGeom prst="rect">
             <a:avLst/>
           </a:prstGeom>
         </p:spPr>
-        <p:style>
-          <a:lnRef idx="2">
-            <a:schemeClr val="accent1">
-              <a:shade val="50000"/>
-            </a:schemeClr>
-          </a:lnRef>
-          <a:fillRef idx="1">
-            <a:schemeClr val="accent1"/>
-          </a:fillRef>
-          <a:effectRef idx="0">
-            <a:schemeClr val="accent1"/>
-          </a:effectRef>
-          <a:fontRef idx="minor">
-            <a:schemeClr val="lt1"/>
-          </a:fontRef>
-        </p:style>
-        <p:txBody>
-          <a:bodyPr rtlCol="0" anchor="ctr"/>
-          <a:lstStyle/>
-          <a:p>
-            <a:pPr algn="ctr"/>
-            <a:endParaRPr lang="en-US"/>
-          </a:p>
-        </p:txBody>
-      </p:sp>
-      <p:sp>
-        <p:nvSpPr>
-          <p:cNvPr id="90" name="TextBox 89"/>
-          <p:cNvSpPr txBox="1"/>
-          <p:nvPr/>
-        </p:nvSpPr>
-        <p:spPr>
-          <a:xfrm>
-            <a:off x="18273486" y="9650969"/>
-            <a:ext cx="4397828" cy="757130"/>
-          </a:xfrm>
-          <a:prstGeom prst="rect">
-            <a:avLst/>
-          </a:prstGeom>
-          <a:noFill/>
-        </p:spPr>
-        <p:txBody>
-          <a:bodyPr wrap="square" rtlCol="0">
-            <a:spAutoFit/>
-          </a:bodyPr>
-          <a:lstStyle/>
-          <a:p>
-            <a:r>
-              <a:rPr lang="en-US" dirty="0" smtClean="0"/>
-              <a:t>White space</a:t>
-            </a:r>
-            <a:endParaRPr lang="en-US" dirty="0"/>
-          </a:p>
-        </p:txBody>
-      </p:sp>
-      <p:sp>
-        <p:nvSpPr>
-          <p:cNvPr id="91" name="Rectangle 90"/>
-          <p:cNvSpPr/>
-          <p:nvPr/>
-        </p:nvSpPr>
-        <p:spPr>
-          <a:xfrm>
-            <a:off x="8620103" y="10397422"/>
-            <a:ext cx="7643984" cy="2386320"/>
-          </a:xfrm>
-          <a:prstGeom prst="rect">
-            <a:avLst/>
-          </a:prstGeom>
-        </p:spPr>
-        <p:style>
-          <a:lnRef idx="2">
-            <a:schemeClr val="accent1">
-              <a:shade val="50000"/>
-            </a:schemeClr>
-          </a:lnRef>
-          <a:fillRef idx="1">
-            <a:schemeClr val="accent1"/>
-          </a:fillRef>
-          <a:effectRef idx="0">
-            <a:schemeClr val="accent1"/>
-          </a:effectRef>
-          <a:fontRef idx="minor">
-            <a:schemeClr val="lt1"/>
-          </a:fontRef>
-        </p:style>
-        <p:txBody>
-          <a:bodyPr rtlCol="0" anchor="ctr"/>
-          <a:lstStyle/>
-          <a:p>
-            <a:pPr algn="ctr"/>
-            <a:endParaRPr lang="en-US"/>
-          </a:p>
-        </p:txBody>
-      </p:sp>
-      <p:sp>
-        <p:nvSpPr>
-          <p:cNvPr id="92" name="TextBox 91"/>
-          <p:cNvSpPr txBox="1"/>
-          <p:nvPr/>
-        </p:nvSpPr>
-        <p:spPr>
-          <a:xfrm>
-            <a:off x="10004297" y="11163068"/>
-            <a:ext cx="4392188" cy="757130"/>
-          </a:xfrm>
-          <a:prstGeom prst="rect">
-            <a:avLst/>
-          </a:prstGeom>
-          <a:noFill/>
-        </p:spPr>
-        <p:txBody>
-          <a:bodyPr wrap="square" rtlCol="0">
-            <a:spAutoFit/>
-          </a:bodyPr>
-          <a:lstStyle/>
-          <a:p>
-            <a:r>
-              <a:rPr lang="en-US" dirty="0" smtClean="0"/>
-              <a:t>White space</a:t>
-            </a:r>
-            <a:endParaRPr lang="en-US" dirty="0"/>
-          </a:p>
-        </p:txBody>
-      </p:sp>
+      </p:pic>
     </p:spTree>
     <p:extLst>
       <p:ext uri="{BB962C8B-B14F-4D97-AF65-F5344CB8AC3E}">

</xml_diff>

<commit_message>
Added a row for the final product section at the bottom.
</commit_message>
<xml_diff>
--- a/Poster.pptx
+++ b/Poster.pptx
@@ -539,11 +539,11 @@
           <c:showPercent val="0"/>
           <c:showBubbleSize val="0"/>
         </c:dLbls>
-        <c:axId val="506226432"/>
-        <c:axId val="506240576"/>
+        <c:axId val="1476100560"/>
+        <c:axId val="1677166240"/>
       </c:scatterChart>
       <c:valAx>
-        <c:axId val="506226432"/>
+        <c:axId val="1476100560"/>
         <c:scaling>
           <c:orientation val="minMax"/>
           <c:max val="11000"/>
@@ -651,12 +651,12 @@
             <a:endParaRPr lang="en-US"/>
           </a:p>
         </c:txPr>
-        <c:crossAx val="506240576"/>
+        <c:crossAx val="1677166240"/>
         <c:crosses val="autoZero"/>
         <c:crossBetween val="midCat"/>
       </c:valAx>
       <c:valAx>
-        <c:axId val="506240576"/>
+        <c:axId val="1677166240"/>
         <c:scaling>
           <c:orientation val="minMax"/>
           <c:min val="0.5"/>
@@ -770,7 +770,7 @@
             <a:endParaRPr lang="en-US"/>
           </a:p>
         </c:txPr>
-        <c:crossAx val="506226432"/>
+        <c:crossAx val="1476100560"/>
         <c:crosses val="autoZero"/>
         <c:crossBetween val="midCat"/>
       </c:valAx>
@@ -4980,13 +4980,6 @@
               </a:rPr>
               <a:t> for Advice and Guidance</a:t>
             </a:r>
-            <a:endParaRPr lang="en-US" sz="2000" dirty="0">
-              <a:solidFill>
-                <a:schemeClr val="bg1"/>
-              </a:solidFill>
-              <a:latin typeface="Arial" panose="020B0604020202020204" pitchFamily="34" charset="0"/>
-              <a:cs typeface="Arial" panose="020B0604020202020204" pitchFamily="34" charset="0"/>
-            </a:endParaRPr>
           </a:p>
         </p:txBody>
       </p:sp>
@@ -5359,7 +5352,7 @@
         </p:nvSpPr>
         <p:spPr>
           <a:xfrm>
-            <a:off x="743526" y="14232844"/>
+            <a:off x="8768459" y="3585901"/>
             <a:ext cx="7643984" cy="3908955"/>
           </a:xfrm>
           <a:prstGeom prst="rect">
@@ -5447,16 +5440,6 @@
               </a:rPr>
               <a:t>Classification Methods</a:t>
             </a:r>
-            <a:endParaRPr lang="en-US" sz="3200" b="1" spc="13" dirty="0" smtClean="0">
-              <a:solidFill>
-                <a:schemeClr val="tx1">
-                  <a:lumMod val="75000"/>
-                  <a:lumOff val="25000"/>
-                </a:schemeClr>
-              </a:solidFill>
-              <a:latin typeface="Arial"/>
-              <a:cs typeface="Arial"/>
-            </a:endParaRPr>
           </a:p>
           <a:p>
             <a:pPr marL="359070" marR="8084" indent="-342900">
@@ -5499,17 +5482,7 @@
                 <a:latin typeface="Arial"/>
                 <a:cs typeface="Arial"/>
               </a:rPr>
-              <a:t>Maximum </a:t>
-            </a:r>
-            <a:r>
-              <a:rPr lang="en-US" sz="2400" spc="13" dirty="0" smtClean="0">
-                <a:solidFill>
-                  <a:srgbClr val="231F20"/>
-                </a:solidFill>
-                <a:latin typeface="Arial"/>
-                <a:cs typeface="Arial"/>
-              </a:rPr>
-              <a:t>Entropy</a:t>
+              <a:t>Maximum Entropy</a:t>
             </a:r>
           </a:p>
           <a:p>
@@ -5562,7 +5535,7 @@
         </p:nvSpPr>
         <p:spPr>
           <a:xfrm>
-            <a:off x="16885875" y="6344073"/>
+            <a:off x="730009" y="14547750"/>
             <a:ext cx="7653799" cy="888385"/>
           </a:xfrm>
           <a:prstGeom prst="rect">
@@ -5781,13 +5754,6 @@
               </a:rPr>
               <a:t>Categorize Tweets based on emotional content</a:t>
             </a:r>
-            <a:endParaRPr lang="en-US" sz="2400" spc="6" dirty="0" smtClean="0">
-              <a:solidFill>
-                <a:srgbClr val="231F20"/>
-              </a:solidFill>
-              <a:latin typeface="Arial" panose="020B0604020202020204" pitchFamily="34" charset="0"/>
-              <a:cs typeface="Arial" panose="020B0604020202020204" pitchFamily="34" charset="0"/>
-            </a:endParaRPr>
           </a:p>
           <a:p>
             <a:pPr marL="282878" marR="8084" indent="-266708">
@@ -6073,7 +6039,7 @@
         </p:nvSpPr>
         <p:spPr>
           <a:xfrm>
-            <a:off x="8620102" y="9692101"/>
+            <a:off x="17264178" y="3609284"/>
             <a:ext cx="7643984" cy="553998"/>
           </a:xfrm>
           <a:prstGeom prst="rect">
@@ -6095,17 +6061,7 @@
                 <a:latin typeface="Arial"/>
                 <a:cs typeface="Arial"/>
               </a:rPr>
-              <a:t>BACK </a:t>
-            </a:r>
-            <a:r>
-              <a:rPr lang="en-US" sz="3600" b="1" dirty="0" smtClean="0">
-                <a:solidFill>
-                  <a:srgbClr val="231F20"/>
-                </a:solidFill>
-                <a:latin typeface="Arial"/>
-                <a:cs typeface="Arial"/>
-              </a:rPr>
-              <a:t>END</a:t>
+              <a:t>BACK END</a:t>
             </a:r>
             <a:endParaRPr sz="3600" dirty="0">
               <a:latin typeface="Arial"/>
@@ -6123,13 +6079,13 @@
           <p:nvPr>
             <p:extLst>
               <p:ext uri="{D42A27DB-BD31-4B8C-83A1-F6EECF244321}">
-                <p14:modId xmlns:p14="http://schemas.microsoft.com/office/powerpoint/2010/main" val="2265079235"/>
+                <p14:modId xmlns:p14="http://schemas.microsoft.com/office/powerpoint/2010/main" val="2762252481"/>
               </p:ext>
             </p:extLst>
           </p:nvPr>
         </p:nvGraphicFramePr>
         <p:xfrm>
-          <a:off x="8618454" y="3639780"/>
+          <a:off x="8541015" y="9392789"/>
           <a:ext cx="7732887" cy="3476020"/>
         </p:xfrm>
         <a:graphic>
@@ -6146,8 +6102,8 @@
         </p:nvSpPr>
         <p:spPr>
           <a:xfrm>
-            <a:off x="16885117" y="14460376"/>
-            <a:ext cx="7653799" cy="3647089"/>
+            <a:off x="730009" y="15321366"/>
+            <a:ext cx="7653799" cy="2056012"/>
           </a:xfrm>
           <a:prstGeom prst="rect">
             <a:avLst/>
@@ -6267,7 +6223,33 @@
               </a:rPr>
               <a:t>Interactivity</a:t>
             </a:r>
-          </a:p>
+            <a:endParaRPr lang="en-US" sz="1867" dirty="0">
+              <a:latin typeface="Arial"/>
+              <a:cs typeface="Arial"/>
+            </a:endParaRPr>
+          </a:p>
+        </p:txBody>
+      </p:sp>
+      <p:sp>
+        <p:nvSpPr>
+          <p:cNvPr id="88" name="object 3"/>
+          <p:cNvSpPr txBox="1"/>
+          <p:nvPr/>
+        </p:nvSpPr>
+        <p:spPr>
+          <a:xfrm>
+            <a:off x="17154739" y="9855655"/>
+            <a:ext cx="7672607" cy="3693127"/>
+          </a:xfrm>
+          <a:prstGeom prst="rect">
+            <a:avLst/>
+          </a:prstGeom>
+        </p:spPr>
+        <p:txBody>
+          <a:bodyPr vert="horz" wrap="square" lIns="0" tIns="0" rIns="0" bIns="0" rtlCol="0">
+            <a:spAutoFit/>
+          </a:bodyPr>
+          <a:lstStyle/>
           <a:p>
             <a:pPr marL="359070" marR="8084" indent="-342900">
               <a:lnSpc>
@@ -6287,7 +6269,7 @@
                 <a:latin typeface="Arial"/>
                 <a:cs typeface="Arial"/>
               </a:rPr>
-              <a:t>“State” Map</a:t>
+              <a:t>Two data streams</a:t>
             </a:r>
           </a:p>
           <a:p>
@@ -6309,17 +6291,29 @@
                 <a:latin typeface="Arial"/>
                 <a:cs typeface="Arial"/>
               </a:rPr>
-              <a:t>Average sentiments of last </a:t>
-            </a:r>
-            <a:r>
-              <a:rPr lang="en-US" sz="2400" b="1" spc="13" dirty="0" smtClean="0">
+              <a:t>“General” and “Trending”</a:t>
+            </a:r>
+          </a:p>
+          <a:p>
+            <a:pPr marL="1456262" marR="8084" lvl="1" indent="-342900">
+              <a:lnSpc>
+                <a:spcPct val="102899"/>
+              </a:lnSpc>
+              <a:spcBef>
+                <a:spcPts val="256"/>
+              </a:spcBef>
+              <a:buFont typeface="Arial" panose="020B0604020202020204" pitchFamily="34" charset="0"/>
+              <a:buChar char="•"/>
+            </a:pPr>
+            <a:r>
+              <a:rPr lang="en-US" sz="2400" spc="13" dirty="0" smtClean="0">
                 <a:solidFill>
                   <a:srgbClr val="231F20"/>
                 </a:solidFill>
                 <a:latin typeface="Arial"/>
                 <a:cs typeface="Arial"/>
               </a:rPr>
-              <a:t>n</a:t>
+              <a:t>Raw tweets saved in </a:t>
             </a:r>
             <a:r>
               <a:rPr lang="en-US" sz="2400" spc="13" dirty="0" smtClean="0">
@@ -6329,8 +6323,12 @@
                 <a:latin typeface="Arial"/>
                 <a:cs typeface="Arial"/>
               </a:rPr>
-              <a:t> tweets</a:t>
-            </a:r>
+              <a:t>cache</a:t>
+            </a:r>
+            <a:endParaRPr lang="en-US" sz="1867" b="1" dirty="0">
+              <a:latin typeface="Arial"/>
+              <a:cs typeface="Arial"/>
+            </a:endParaRPr>
           </a:p>
           <a:p>
             <a:pPr marL="359070" marR="8084" indent="-342900">
@@ -6344,56 +6342,13 @@
               <a:buChar char="•"/>
             </a:pPr>
             <a:r>
-              <a:rPr lang="en-US" sz="2400" spc="13" dirty="0" smtClean="0">
-                <a:solidFill>
-                  <a:srgbClr val="231F20"/>
-                </a:solidFill>
+              <a:rPr lang="en-US" sz="2400" dirty="0">
                 <a:latin typeface="Arial"/>
                 <a:cs typeface="Arial"/>
               </a:rPr>
-              <a:t>Google Maps API</a:t>
-            </a:r>
-            <a:endParaRPr lang="en-US" sz="2400" dirty="0">
-              <a:latin typeface="Arial"/>
-              <a:cs typeface="Arial"/>
-            </a:endParaRPr>
-          </a:p>
-          <a:p>
-            <a:pPr marL="16170" marR="8084">
-              <a:lnSpc>
-                <a:spcPct val="102899"/>
-              </a:lnSpc>
-              <a:spcBef>
-                <a:spcPts val="256"/>
-              </a:spcBef>
-            </a:pPr>
-            <a:endParaRPr lang="en-US" sz="1867" dirty="0">
-              <a:latin typeface="Arial"/>
-              <a:cs typeface="Arial"/>
-            </a:endParaRPr>
-          </a:p>
-        </p:txBody>
-      </p:sp>
-      <p:sp>
-        <p:nvSpPr>
-          <p:cNvPr id="88" name="object 3"/>
-          <p:cNvSpPr txBox="1"/>
-          <p:nvPr/>
-        </p:nvSpPr>
-        <p:spPr>
-          <a:xfrm>
-            <a:off x="8554674" y="16563269"/>
-            <a:ext cx="7672607" cy="1218219"/>
-          </a:xfrm>
-          <a:prstGeom prst="rect">
-            <a:avLst/>
-          </a:prstGeom>
-        </p:spPr>
-        <p:txBody>
-          <a:bodyPr vert="horz" wrap="square" lIns="0" tIns="0" rIns="0" bIns="0" rtlCol="0">
-            <a:spAutoFit/>
-          </a:bodyPr>
-          <a:lstStyle/>
+              <a:t>Natural Language Processing categorizers perform sentiment analysis on raw Tweets</a:t>
+            </a:r>
+          </a:p>
           <a:p>
             <a:pPr marL="359070" marR="8084" indent="-342900">
               <a:lnSpc>
@@ -6406,14 +6361,30 @@
               <a:buChar char="•"/>
             </a:pPr>
             <a:r>
-              <a:rPr lang="en-US" sz="2400" spc="13" dirty="0" smtClean="0">
-                <a:solidFill>
-                  <a:srgbClr val="231F20"/>
-                </a:solidFill>
+              <a:rPr lang="en-US" sz="2400" dirty="0">
                 <a:latin typeface="Arial"/>
                 <a:cs typeface="Arial"/>
               </a:rPr>
-              <a:t>Two data streams</a:t>
+              <a:t>Middleware serves processed Tweets to clients</a:t>
+            </a:r>
+          </a:p>
+          <a:p>
+            <a:pPr marL="359070" marR="8084" indent="-342900">
+              <a:lnSpc>
+                <a:spcPct val="102899"/>
+              </a:lnSpc>
+              <a:spcBef>
+                <a:spcPts val="256"/>
+              </a:spcBef>
+              <a:buFont typeface="Arial" panose="020B0604020202020204" pitchFamily="34" charset="0"/>
+              <a:buChar char="•"/>
+            </a:pPr>
+            <a:r>
+              <a:rPr lang="en-US" sz="2400" dirty="0">
+                <a:latin typeface="Arial"/>
+                <a:cs typeface="Arial"/>
+              </a:rPr>
+              <a:t>Structure</a:t>
             </a:r>
           </a:p>
           <a:p>
@@ -6428,14 +6399,25 @@
               <a:buChar char="•"/>
             </a:pPr>
             <a:r>
-              <a:rPr lang="en-US" sz="2400" spc="13" dirty="0" smtClean="0">
-                <a:solidFill>
-                  <a:srgbClr val="231F20"/>
-                </a:solidFill>
+              <a:rPr lang="en-US" sz="2400" dirty="0">
                 <a:latin typeface="Arial"/>
                 <a:cs typeface="Arial"/>
               </a:rPr>
-              <a:t>“General” and “Trending”</a:t>
+              <a:t>Using </a:t>
+            </a:r>
+            <a:r>
+              <a:rPr lang="en-US" sz="2400" dirty="0" err="1">
+                <a:latin typeface="Arial"/>
+                <a:cs typeface="Arial"/>
+              </a:rPr>
+              <a:t>Redis</a:t>
+            </a:r>
+            <a:r>
+              <a:rPr lang="en-US" sz="2400" dirty="0">
+                <a:latin typeface="Arial"/>
+                <a:cs typeface="Arial"/>
+              </a:rPr>
+              <a:t> as a cache</a:t>
             </a:r>
           </a:p>
           <a:p>
@@ -6450,16 +6432,13 @@
               <a:buChar char="•"/>
             </a:pPr>
             <a:r>
-              <a:rPr lang="en-US" sz="2400" spc="13" dirty="0" smtClean="0">
-                <a:solidFill>
-                  <a:srgbClr val="231F20"/>
-                </a:solidFill>
+              <a:rPr lang="en-US" sz="2400" dirty="0" smtClean="0">
                 <a:latin typeface="Arial"/>
                 <a:cs typeface="Arial"/>
               </a:rPr>
-              <a:t>Raw tweets saved in cache</a:t>
-            </a:r>
-            <a:endParaRPr lang="en-US" sz="1867" dirty="0">
+              <a:t>Python/Node.js</a:t>
+            </a:r>
+            <a:endParaRPr lang="en-US" sz="2400" dirty="0">
               <a:latin typeface="Arial"/>
               <a:cs typeface="Arial"/>
             </a:endParaRPr>
@@ -6489,7 +6468,7 @@
         </p:blipFill>
         <p:spPr bwMode="auto">
           <a:xfrm>
-            <a:off x="8619344" y="10231318"/>
+            <a:off x="17263420" y="4148501"/>
             <a:ext cx="5693836" cy="5343344"/>
           </a:xfrm>
           <a:prstGeom prst="rect">
@@ -6516,7 +6495,7 @@
           <p:nvPr/>
         </p:nvPicPr>
         <p:blipFill>
-          <a:blip r:embed="rId5">
+          <a:blip r:embed="rId5" cstate="print">
             <a:extLst>
               <a:ext uri="{28A0092B-C50C-407E-A947-70E740481C1C}">
                 <a14:useLocalDpi xmlns:a14="http://schemas.microsoft.com/office/drawing/2010/main" val="0"/>
@@ -6530,8 +6509,8 @@
         </p:blipFill>
         <p:spPr bwMode="auto">
           <a:xfrm>
-            <a:off x="16743933" y="7018149"/>
-            <a:ext cx="7794983" cy="4876736"/>
+            <a:off x="17701375" y="14547750"/>
+            <a:ext cx="5603291" cy="3505558"/>
           </a:xfrm>
           <a:prstGeom prst="rect">
             <a:avLst/>
@@ -6548,155 +6527,6 @@
           </a:extLst>
         </p:spPr>
       </p:pic>
-      <p:sp>
-        <p:nvSpPr>
-          <p:cNvPr id="38" name="object 3"/>
-          <p:cNvSpPr txBox="1"/>
-          <p:nvPr/>
-        </p:nvSpPr>
-        <p:spPr>
-          <a:xfrm>
-            <a:off x="16911854" y="3583976"/>
-            <a:ext cx="7672607" cy="2770823"/>
-          </a:xfrm>
-          <a:prstGeom prst="rect">
-            <a:avLst/>
-          </a:prstGeom>
-        </p:spPr>
-        <p:txBody>
-          <a:bodyPr vert="horz" wrap="square" lIns="0" tIns="0" rIns="0" bIns="0" rtlCol="0">
-            <a:spAutoFit/>
-          </a:bodyPr>
-          <a:lstStyle/>
-          <a:p>
-            <a:pPr marL="359070" marR="8084" indent="-342900">
-              <a:lnSpc>
-                <a:spcPct val="102899"/>
-              </a:lnSpc>
-              <a:spcBef>
-                <a:spcPts val="256"/>
-              </a:spcBef>
-              <a:buFont typeface="Arial" panose="020B0604020202020204" pitchFamily="34" charset="0"/>
-              <a:buChar char="•"/>
-            </a:pPr>
-            <a:r>
-              <a:rPr lang="en-US" sz="2400" dirty="0" smtClean="0">
-                <a:latin typeface="Arial"/>
-                <a:cs typeface="Arial"/>
-              </a:rPr>
-              <a:t>Natural Language Processing categorizers perform sentiment analysis on raw Tweets</a:t>
-            </a:r>
-          </a:p>
-          <a:p>
-            <a:pPr marL="359070" marR="8084" indent="-342900">
-              <a:lnSpc>
-                <a:spcPct val="102899"/>
-              </a:lnSpc>
-              <a:spcBef>
-                <a:spcPts val="256"/>
-              </a:spcBef>
-              <a:buFont typeface="Arial" panose="020B0604020202020204" pitchFamily="34" charset="0"/>
-              <a:buChar char="•"/>
-            </a:pPr>
-            <a:r>
-              <a:rPr lang="en-US" sz="2400" dirty="0" smtClean="0">
-                <a:latin typeface="Arial"/>
-                <a:cs typeface="Arial"/>
-              </a:rPr>
-              <a:t>Middleware serves processed Tweets to clients</a:t>
-            </a:r>
-          </a:p>
-          <a:p>
-            <a:pPr marL="359070" marR="8084" indent="-342900">
-              <a:lnSpc>
-                <a:spcPct val="102899"/>
-              </a:lnSpc>
-              <a:spcBef>
-                <a:spcPts val="256"/>
-              </a:spcBef>
-              <a:buFont typeface="Arial" panose="020B0604020202020204" pitchFamily="34" charset="0"/>
-              <a:buChar char="•"/>
-            </a:pPr>
-            <a:r>
-              <a:rPr lang="en-US" sz="2400" dirty="0" smtClean="0">
-                <a:latin typeface="Arial"/>
-                <a:cs typeface="Arial"/>
-              </a:rPr>
-              <a:t>Structure</a:t>
-            </a:r>
-          </a:p>
-          <a:p>
-            <a:pPr marL="1456262" marR="8084" lvl="1" indent="-342900">
-              <a:lnSpc>
-                <a:spcPct val="102899"/>
-              </a:lnSpc>
-              <a:spcBef>
-                <a:spcPts val="256"/>
-              </a:spcBef>
-              <a:buFont typeface="Arial" panose="020B0604020202020204" pitchFamily="34" charset="0"/>
-              <a:buChar char="•"/>
-            </a:pPr>
-            <a:r>
-              <a:rPr lang="en-US" sz="2400" dirty="0" smtClean="0">
-                <a:latin typeface="Arial"/>
-                <a:cs typeface="Arial"/>
-              </a:rPr>
-              <a:t>Using </a:t>
-            </a:r>
-            <a:r>
-              <a:rPr lang="en-US" sz="2400" dirty="0" err="1" smtClean="0">
-                <a:latin typeface="Arial"/>
-                <a:cs typeface="Arial"/>
-              </a:rPr>
-              <a:t>Redis</a:t>
-            </a:r>
-            <a:r>
-              <a:rPr lang="en-US" sz="2400" dirty="0" smtClean="0">
-                <a:latin typeface="Arial"/>
-                <a:cs typeface="Arial"/>
-              </a:rPr>
-              <a:t> as a cache</a:t>
-            </a:r>
-          </a:p>
-          <a:p>
-            <a:pPr marL="1456262" marR="8084" lvl="1" indent="-342900">
-              <a:lnSpc>
-                <a:spcPct val="102899"/>
-              </a:lnSpc>
-              <a:spcBef>
-                <a:spcPts val="256"/>
-              </a:spcBef>
-              <a:buFont typeface="Arial" panose="020B0604020202020204" pitchFamily="34" charset="0"/>
-              <a:buChar char="•"/>
-            </a:pPr>
-            <a:r>
-              <a:rPr lang="en-US" sz="2400" dirty="0" smtClean="0">
-                <a:latin typeface="Arial"/>
-                <a:cs typeface="Arial"/>
-              </a:rPr>
-              <a:t>Python/Node.js</a:t>
-            </a:r>
-            <a:endParaRPr lang="en-US" sz="2400" dirty="0">
-              <a:latin typeface="Arial"/>
-              <a:cs typeface="Arial"/>
-            </a:endParaRPr>
-          </a:p>
-          <a:p>
-            <a:pPr marL="16170" marR="8084">
-              <a:lnSpc>
-                <a:spcPct val="102899"/>
-              </a:lnSpc>
-              <a:spcBef>
-                <a:spcPts val="256"/>
-              </a:spcBef>
-            </a:pPr>
-            <a:endParaRPr lang="en-US" sz="1867" dirty="0">
-              <a:latin typeface="Arial"/>
-              <a:cs typeface="Arial"/>
-            </a:endParaRPr>
-          </a:p>
-        </p:txBody>
-      </p:sp>
       <p:pic>
         <p:nvPicPr>
           <p:cNvPr id="1034" name="Picture 10" descr="countymaprb1024.png"/>
@@ -6801,6 +6631,296 @@
           </a:prstGeom>
         </p:spPr>
       </p:pic>
+      <p:sp>
+        <p:nvSpPr>
+          <p:cNvPr id="33" name="object 18"/>
+          <p:cNvSpPr/>
+          <p:nvPr/>
+        </p:nvSpPr>
+        <p:spPr>
+          <a:xfrm>
+            <a:off x="646548" y="14283780"/>
+            <a:ext cx="24180798" cy="1489510"/>
+          </a:xfrm>
+          <a:custGeom>
+            <a:avLst/>
+            <a:gdLst/>
+            <a:ahLst/>
+            <a:cxnLst/>
+            <a:rect l="l" t="t" r="r" b="b"/>
+            <a:pathLst>
+              <a:path w="18149533">
+                <a:moveTo>
+                  <a:pt x="0" y="0"/>
+                </a:moveTo>
+                <a:lnTo>
+                  <a:pt x="18149533" y="0"/>
+                </a:lnTo>
+              </a:path>
+            </a:pathLst>
+          </a:custGeom>
+          <a:ln w="9602">
+            <a:solidFill>
+              <a:srgbClr val="717272"/>
+            </a:solidFill>
+          </a:ln>
+        </p:spPr>
+        <p:txBody>
+          <a:bodyPr wrap="square" lIns="0" tIns="0" rIns="0" bIns="0" rtlCol="0">
+            <a:spAutoFit/>
+          </a:bodyPr>
+          <a:lstStyle/>
+          <a:p>
+            <a:endParaRPr sz="9679"/>
+          </a:p>
+        </p:txBody>
+      </p:sp>
+      <p:sp>
+        <p:nvSpPr>
+          <p:cNvPr id="34" name="object 3"/>
+          <p:cNvSpPr txBox="1"/>
+          <p:nvPr/>
+        </p:nvSpPr>
+        <p:spPr>
+          <a:xfrm>
+            <a:off x="8768459" y="14553591"/>
+            <a:ext cx="7653799" cy="1552605"/>
+          </a:xfrm>
+          <a:prstGeom prst="rect">
+            <a:avLst/>
+          </a:prstGeom>
+        </p:spPr>
+        <p:txBody>
+          <a:bodyPr vert="horz" wrap="square" lIns="0" tIns="0" rIns="0" bIns="0" rtlCol="0">
+            <a:spAutoFit/>
+          </a:bodyPr>
+          <a:lstStyle/>
+          <a:p>
+            <a:pPr marL="359070" marR="8084" indent="-342900">
+              <a:lnSpc>
+                <a:spcPct val="102899"/>
+              </a:lnSpc>
+              <a:spcBef>
+                <a:spcPts val="256"/>
+              </a:spcBef>
+              <a:buFont typeface="Arial" panose="020B0604020202020204" pitchFamily="34" charset="0"/>
+              <a:buChar char="•"/>
+            </a:pPr>
+            <a:r>
+              <a:rPr lang="en-US" sz="2400" spc="13" dirty="0" smtClean="0">
+                <a:solidFill>
+                  <a:srgbClr val="231F20"/>
+                </a:solidFill>
+                <a:latin typeface="Arial"/>
+                <a:cs typeface="Arial"/>
+              </a:rPr>
+              <a:t>“</a:t>
+            </a:r>
+            <a:r>
+              <a:rPr lang="en-US" sz="2400" spc="13" dirty="0" smtClean="0">
+                <a:solidFill>
+                  <a:srgbClr val="231F20"/>
+                </a:solidFill>
+                <a:latin typeface="Arial"/>
+                <a:cs typeface="Arial"/>
+              </a:rPr>
+              <a:t>State” Map</a:t>
+            </a:r>
+          </a:p>
+          <a:p>
+            <a:pPr marL="1456262" marR="8084" lvl="1" indent="-342900">
+              <a:lnSpc>
+                <a:spcPct val="102899"/>
+              </a:lnSpc>
+              <a:spcBef>
+                <a:spcPts val="256"/>
+              </a:spcBef>
+              <a:buFont typeface="Arial" panose="020B0604020202020204" pitchFamily="34" charset="0"/>
+              <a:buChar char="•"/>
+            </a:pPr>
+            <a:r>
+              <a:rPr lang="en-US" sz="2400" spc="13" dirty="0" smtClean="0">
+                <a:solidFill>
+                  <a:srgbClr val="231F20"/>
+                </a:solidFill>
+                <a:latin typeface="Arial"/>
+                <a:cs typeface="Arial"/>
+              </a:rPr>
+              <a:t>Average sentiments of last </a:t>
+            </a:r>
+            <a:r>
+              <a:rPr lang="en-US" sz="2400" b="1" spc="13" dirty="0" smtClean="0">
+                <a:solidFill>
+                  <a:srgbClr val="231F20"/>
+                </a:solidFill>
+                <a:latin typeface="Arial"/>
+                <a:cs typeface="Arial"/>
+              </a:rPr>
+              <a:t>n</a:t>
+            </a:r>
+            <a:r>
+              <a:rPr lang="en-US" sz="2400" spc="13" dirty="0" smtClean="0">
+                <a:solidFill>
+                  <a:srgbClr val="231F20"/>
+                </a:solidFill>
+                <a:latin typeface="Arial"/>
+                <a:cs typeface="Arial"/>
+              </a:rPr>
+              <a:t> tweets</a:t>
+            </a:r>
+          </a:p>
+          <a:p>
+            <a:pPr marL="359070" marR="8084" indent="-342900">
+              <a:lnSpc>
+                <a:spcPct val="102899"/>
+              </a:lnSpc>
+              <a:spcBef>
+                <a:spcPts val="256"/>
+              </a:spcBef>
+              <a:buFont typeface="Arial" panose="020B0604020202020204" pitchFamily="34" charset="0"/>
+              <a:buChar char="•"/>
+            </a:pPr>
+            <a:r>
+              <a:rPr lang="en-US" sz="2400" spc="13" dirty="0" smtClean="0">
+                <a:solidFill>
+                  <a:srgbClr val="231F20"/>
+                </a:solidFill>
+                <a:latin typeface="Arial"/>
+                <a:cs typeface="Arial"/>
+              </a:rPr>
+              <a:t>Google Maps API</a:t>
+            </a:r>
+            <a:endParaRPr lang="en-US" sz="2400" dirty="0">
+              <a:latin typeface="Arial"/>
+              <a:cs typeface="Arial"/>
+            </a:endParaRPr>
+          </a:p>
+          <a:p>
+            <a:pPr marL="16170" marR="8084">
+              <a:lnSpc>
+                <a:spcPct val="102899"/>
+              </a:lnSpc>
+              <a:spcBef>
+                <a:spcPts val="256"/>
+              </a:spcBef>
+            </a:pPr>
+            <a:endParaRPr lang="en-US" sz="1867" dirty="0">
+              <a:latin typeface="Arial"/>
+              <a:cs typeface="Arial"/>
+            </a:endParaRPr>
+          </a:p>
+        </p:txBody>
+      </p:sp>
+      <p:sp>
+        <p:nvSpPr>
+          <p:cNvPr id="35" name="object 19"/>
+          <p:cNvSpPr/>
+          <p:nvPr/>
+        </p:nvSpPr>
+        <p:spPr>
+          <a:xfrm>
+            <a:off x="8554674" y="14535526"/>
+            <a:ext cx="65429" cy="1489510"/>
+          </a:xfrm>
+          <a:custGeom>
+            <a:avLst/>
+            <a:gdLst/>
+            <a:ahLst/>
+            <a:cxnLst/>
+            <a:rect l="l" t="t" r="r" b="b"/>
+            <a:pathLst>
+              <a:path h="5507297">
+                <a:moveTo>
+                  <a:pt x="0" y="0"/>
+                </a:moveTo>
+                <a:lnTo>
+                  <a:pt x="0" y="5507297"/>
+                </a:lnTo>
+              </a:path>
+            </a:pathLst>
+          </a:custGeom>
+          <a:ln w="19050" cmpd="sng">
+            <a:solidFill>
+              <a:schemeClr val="tx1">
+                <a:lumMod val="50000"/>
+                <a:lumOff val="50000"/>
+              </a:schemeClr>
+            </a:solidFill>
+            <a:prstDash val="dot"/>
+          </a:ln>
+        </p:spPr>
+        <p:txBody>
+          <a:bodyPr wrap="square" lIns="0" tIns="0" rIns="0" bIns="0" rtlCol="0">
+            <a:spAutoFit/>
+          </a:bodyPr>
+          <a:lstStyle/>
+          <a:p>
+            <a:endParaRPr sz="9679">
+              <a:ln>
+                <a:solidFill>
+                  <a:schemeClr val="tx1"/>
+                </a:solidFill>
+                <a:prstDash val="dot"/>
+              </a:ln>
+            </a:endParaRPr>
+          </a:p>
+        </p:txBody>
+      </p:sp>
+      <p:sp>
+        <p:nvSpPr>
+          <p:cNvPr id="36" name="object 19"/>
+          <p:cNvSpPr/>
+          <p:nvPr/>
+        </p:nvSpPr>
+        <p:spPr>
+          <a:xfrm>
+            <a:off x="16743933" y="14550320"/>
+            <a:ext cx="65429" cy="1489510"/>
+          </a:xfrm>
+          <a:custGeom>
+            <a:avLst/>
+            <a:gdLst/>
+            <a:ahLst/>
+            <a:cxnLst/>
+            <a:rect l="l" t="t" r="r" b="b"/>
+            <a:pathLst>
+              <a:path h="5507297">
+                <a:moveTo>
+                  <a:pt x="0" y="0"/>
+                </a:moveTo>
+                <a:lnTo>
+                  <a:pt x="0" y="5507297"/>
+                </a:lnTo>
+              </a:path>
+            </a:pathLst>
+          </a:custGeom>
+          <a:ln w="19050" cmpd="sng">
+            <a:solidFill>
+              <a:schemeClr val="tx1">
+                <a:lumMod val="50000"/>
+                <a:lumOff val="50000"/>
+              </a:schemeClr>
+            </a:solidFill>
+            <a:prstDash val="dot"/>
+          </a:ln>
+        </p:spPr>
+        <p:txBody>
+          <a:bodyPr wrap="square" lIns="0" tIns="0" rIns="0" bIns="0" rtlCol="0">
+            <a:spAutoFit/>
+          </a:bodyPr>
+          <a:lstStyle/>
+          <a:p>
+            <a:endParaRPr sz="9679">
+              <a:ln>
+                <a:solidFill>
+                  <a:schemeClr val="tx1"/>
+                </a:solidFill>
+                <a:prstDash val="dot"/>
+              </a:ln>
+            </a:endParaRPr>
+          </a:p>
+        </p:txBody>
+      </p:sp>
     </p:spTree>
     <p:extLst>
       <p:ext uri="{BB962C8B-B14F-4D97-AF65-F5344CB8AC3E}">

</xml_diff>

<commit_message>
Fixed a minor thing on the poster.
</commit_message>
<xml_diff>
--- a/Poster.pptx
+++ b/Poster.pptx
@@ -146,7 +146,7 @@
               </a:defRPr>
             </a:pPr>
             <a:r>
-              <a:rPr lang="en-US" sz="2800" dirty="0">
+              <a:rPr lang="en-US" sz="2800" b="1" dirty="0">
                 <a:latin typeface="Arial" panose="020B0604020202020204" pitchFamily="34" charset="0"/>
                 <a:cs typeface="Arial" panose="020B0604020202020204" pitchFamily="34" charset="0"/>
               </a:rPr>
@@ -539,11 +539,11 @@
           <c:showPercent val="0"/>
           <c:showBubbleSize val="0"/>
         </c:dLbls>
-        <c:axId val="1476100560"/>
-        <c:axId val="1677166240"/>
+        <c:axId val="1589664912"/>
+        <c:axId val="1589657840"/>
       </c:scatterChart>
       <c:valAx>
-        <c:axId val="1476100560"/>
+        <c:axId val="1589664912"/>
         <c:scaling>
           <c:orientation val="minMax"/>
           <c:max val="11000"/>
@@ -651,12 +651,12 @@
             <a:endParaRPr lang="en-US"/>
           </a:p>
         </c:txPr>
-        <c:crossAx val="1677166240"/>
+        <c:crossAx val="1589657840"/>
         <c:crosses val="autoZero"/>
         <c:crossBetween val="midCat"/>
       </c:valAx>
       <c:valAx>
-        <c:axId val="1677166240"/>
+        <c:axId val="1589657840"/>
         <c:scaling>
           <c:orientation val="minMax"/>
           <c:min val="0.5"/>
@@ -770,7 +770,7 @@
             <a:endParaRPr lang="en-US"/>
           </a:p>
         </c:txPr>
-        <c:crossAx val="1476100560"/>
+        <c:crossAx val="1589664912"/>
         <c:crosses val="autoZero"/>
         <c:crossBetween val="midCat"/>
       </c:valAx>
@@ -4780,8 +4780,8 @@
         </p:nvSpPr>
         <p:spPr>
           <a:xfrm>
-            <a:off x="28623" y="18523293"/>
-            <a:ext cx="25603199" cy="1489510"/>
+            <a:off x="-32327" y="18523293"/>
+            <a:ext cx="25664149" cy="1489510"/>
           </a:xfrm>
           <a:custGeom>
             <a:avLst/>
@@ -5939,7 +5939,7 @@
         <p:spPr>
           <a:xfrm>
             <a:off x="8768459" y="7435260"/>
-            <a:ext cx="7643984" cy="2123210"/>
+            <a:ext cx="7643984" cy="2859116"/>
           </a:xfrm>
           <a:prstGeom prst="rect">
             <a:avLst/>
@@ -6009,6 +6009,25 @@
                 <a:cs typeface="Arial"/>
               </a:rPr>
               <a:t>Naïve Bayes fastest; trained on 1.6 million tweets</a:t>
+            </a:r>
+          </a:p>
+          <a:p>
+            <a:pPr marL="1456262" marR="8084" lvl="1" indent="-342900">
+              <a:lnSpc>
+                <a:spcPct val="102899"/>
+              </a:lnSpc>
+              <a:spcBef>
+                <a:spcPts val="256"/>
+              </a:spcBef>
+              <a:buFont typeface="Arial" panose="020B0604020202020204" pitchFamily="34" charset="0"/>
+              <a:buChar char="•"/>
+            </a:pPr>
+            <a:r>
+              <a:rPr lang="en-US" sz="2400" dirty="0" smtClean="0">
+                <a:latin typeface="Arial"/>
+                <a:cs typeface="Arial"/>
+              </a:rPr>
+              <a:t>Most accurate classifier when trained on full data set</a:t>
             </a:r>
             <a:endParaRPr lang="en-US" sz="2400" dirty="0">
               <a:latin typeface="Arial"/>
@@ -6079,13 +6098,13 @@
           <p:nvPr>
             <p:extLst>
               <p:ext uri="{D42A27DB-BD31-4B8C-83A1-F6EECF244321}">
-                <p14:modId xmlns:p14="http://schemas.microsoft.com/office/powerpoint/2010/main" val="2762252481"/>
+                <p14:modId xmlns:p14="http://schemas.microsoft.com/office/powerpoint/2010/main" val="4173780114"/>
               </p:ext>
             </p:extLst>
           </p:nvPr>
         </p:nvGraphicFramePr>
         <p:xfrm>
-          <a:off x="8541015" y="9392789"/>
+          <a:off x="8339022" y="10294376"/>
           <a:ext cx="7732887" cy="3476020"/>
         </p:xfrm>
         <a:graphic>
@@ -6313,17 +6332,7 @@
                 <a:latin typeface="Arial"/>
                 <a:cs typeface="Arial"/>
               </a:rPr>
-              <a:t>Raw tweets saved in </a:t>
-            </a:r>
-            <a:r>
-              <a:rPr lang="en-US" sz="2400" spc="13" dirty="0" smtClean="0">
-                <a:solidFill>
-                  <a:srgbClr val="231F20"/>
-                </a:solidFill>
-                <a:latin typeface="Arial"/>
-                <a:cs typeface="Arial"/>
-              </a:rPr>
-              <a:t>cache</a:t>
+              <a:t>Raw tweets saved in cache</a:t>
             </a:r>
             <a:endParaRPr lang="en-US" sz="1867" b="1" dirty="0">
               <a:latin typeface="Arial"/>
@@ -6509,7 +6518,7 @@
         </p:blipFill>
         <p:spPr bwMode="auto">
           <a:xfrm>
-            <a:off x="17701375" y="14547750"/>
+            <a:off x="17263420" y="14547750"/>
             <a:ext cx="5603291" cy="3505558"/>
           </a:xfrm>
           <a:prstGeom prst="rect">
@@ -6683,7 +6692,7 @@
         </p:nvSpPr>
         <p:spPr>
           <a:xfrm>
-            <a:off x="8768459" y="14553591"/>
+            <a:off x="8768459" y="15321366"/>
             <a:ext cx="7653799" cy="1552605"/>
           </a:xfrm>
           <a:prstGeom prst="rect">
@@ -6714,17 +6723,7 @@
                 <a:latin typeface="Arial"/>
                 <a:cs typeface="Arial"/>
               </a:rPr>
-              <a:t>“</a:t>
-            </a:r>
-            <a:r>
-              <a:rPr lang="en-US" sz="2400" spc="13" dirty="0" smtClean="0">
-                <a:solidFill>
-                  <a:srgbClr val="231F20"/>
-                </a:solidFill>
-                <a:latin typeface="Arial"/>
-                <a:cs typeface="Arial"/>
-              </a:rPr>
-              <a:t>State” Map</a:t>
+              <a:t>“State” Map</a:t>
             </a:r>
           </a:p>
           <a:p>
@@ -6807,116 +6806,6 @@
             <a:endParaRPr lang="en-US" sz="1867" dirty="0">
               <a:latin typeface="Arial"/>
               <a:cs typeface="Arial"/>
-            </a:endParaRPr>
-          </a:p>
-        </p:txBody>
-      </p:sp>
-      <p:sp>
-        <p:nvSpPr>
-          <p:cNvPr id="35" name="object 19"/>
-          <p:cNvSpPr/>
-          <p:nvPr/>
-        </p:nvSpPr>
-        <p:spPr>
-          <a:xfrm>
-            <a:off x="8554674" y="14535526"/>
-            <a:ext cx="65429" cy="1489510"/>
-          </a:xfrm>
-          <a:custGeom>
-            <a:avLst/>
-            <a:gdLst/>
-            <a:ahLst/>
-            <a:cxnLst/>
-            <a:rect l="l" t="t" r="r" b="b"/>
-            <a:pathLst>
-              <a:path h="5507297">
-                <a:moveTo>
-                  <a:pt x="0" y="0"/>
-                </a:moveTo>
-                <a:lnTo>
-                  <a:pt x="0" y="5507297"/>
-                </a:lnTo>
-              </a:path>
-            </a:pathLst>
-          </a:custGeom>
-          <a:ln w="19050" cmpd="sng">
-            <a:solidFill>
-              <a:schemeClr val="tx1">
-                <a:lumMod val="50000"/>
-                <a:lumOff val="50000"/>
-              </a:schemeClr>
-            </a:solidFill>
-            <a:prstDash val="dot"/>
-          </a:ln>
-        </p:spPr>
-        <p:txBody>
-          <a:bodyPr wrap="square" lIns="0" tIns="0" rIns="0" bIns="0" rtlCol="0">
-            <a:spAutoFit/>
-          </a:bodyPr>
-          <a:lstStyle/>
-          <a:p>
-            <a:endParaRPr sz="9679">
-              <a:ln>
-                <a:solidFill>
-                  <a:schemeClr val="tx1"/>
-                </a:solidFill>
-                <a:prstDash val="dot"/>
-              </a:ln>
-            </a:endParaRPr>
-          </a:p>
-        </p:txBody>
-      </p:sp>
-      <p:sp>
-        <p:nvSpPr>
-          <p:cNvPr id="36" name="object 19"/>
-          <p:cNvSpPr/>
-          <p:nvPr/>
-        </p:nvSpPr>
-        <p:spPr>
-          <a:xfrm>
-            <a:off x="16743933" y="14550320"/>
-            <a:ext cx="65429" cy="1489510"/>
-          </a:xfrm>
-          <a:custGeom>
-            <a:avLst/>
-            <a:gdLst/>
-            <a:ahLst/>
-            <a:cxnLst/>
-            <a:rect l="l" t="t" r="r" b="b"/>
-            <a:pathLst>
-              <a:path h="5507297">
-                <a:moveTo>
-                  <a:pt x="0" y="0"/>
-                </a:moveTo>
-                <a:lnTo>
-                  <a:pt x="0" y="5507297"/>
-                </a:lnTo>
-              </a:path>
-            </a:pathLst>
-          </a:custGeom>
-          <a:ln w="19050" cmpd="sng">
-            <a:solidFill>
-              <a:schemeClr val="tx1">
-                <a:lumMod val="50000"/>
-                <a:lumOff val="50000"/>
-              </a:schemeClr>
-            </a:solidFill>
-            <a:prstDash val="dot"/>
-          </a:ln>
-        </p:spPr>
-        <p:txBody>
-          <a:bodyPr wrap="square" lIns="0" tIns="0" rIns="0" bIns="0" rtlCol="0">
-            <a:spAutoFit/>
-          </a:bodyPr>
-          <a:lstStyle/>
-          <a:p>
-            <a:endParaRPr sz="9679">
-              <a:ln>
-                <a:solidFill>
-                  <a:schemeClr val="tx1"/>
-                </a:solidFill>
-                <a:prstDash val="dot"/>
-              </a:ln>
             </a:endParaRPr>
           </a:p>
         </p:txBody>

</xml_diff>